<commit_message>
Add diagrams to perceptron article
</commit_message>
<xml_diff>
--- a/_diagrams/the-perceptron/the-perceptron.pptx
+++ b/_diagrams/the-perceptron/the-perceptron.pptx
@@ -7,7 +7,9 @@
   <p:sldIdLst>
     <p:sldId id="256" r:id="rId2"/>
     <p:sldId id="257" r:id="rId3"/>
-    <p:sldId id="258" r:id="rId4"/>
+    <p:sldId id="259" r:id="rId4"/>
+    <p:sldId id="260" r:id="rId5"/>
+    <p:sldId id="258" r:id="rId6"/>
   </p:sldIdLst>
   <p:sldSz cx="12192000" cy="6858000"/>
   <p:notesSz cx="6858000" cy="9144000"/>
@@ -261,7 +263,7 @@
           <a:p>
             <a:fld id="{1FF31F5F-B693-484B-AA3D-F43312839E9C}" type="datetimeFigureOut">
               <a:rPr lang="en-US" smtClean="0"/>
-              <a:t>2/18/2020</a:t>
+              <a:t>2/20/2020</a:t>
             </a:fld>
             <a:endParaRPr lang="en-US"/>
           </a:p>
@@ -459,7 +461,7 @@
           <a:p>
             <a:fld id="{1FF31F5F-B693-484B-AA3D-F43312839E9C}" type="datetimeFigureOut">
               <a:rPr lang="en-US" smtClean="0"/>
-              <a:t>2/18/2020</a:t>
+              <a:t>2/20/2020</a:t>
             </a:fld>
             <a:endParaRPr lang="en-US"/>
           </a:p>
@@ -667,7 +669,7 @@
           <a:p>
             <a:fld id="{1FF31F5F-B693-484B-AA3D-F43312839E9C}" type="datetimeFigureOut">
               <a:rPr lang="en-US" smtClean="0"/>
-              <a:t>2/18/2020</a:t>
+              <a:t>2/20/2020</a:t>
             </a:fld>
             <a:endParaRPr lang="en-US"/>
           </a:p>
@@ -865,7 +867,7 @@
           <a:p>
             <a:fld id="{1FF31F5F-B693-484B-AA3D-F43312839E9C}" type="datetimeFigureOut">
               <a:rPr lang="en-US" smtClean="0"/>
-              <a:t>2/18/2020</a:t>
+              <a:t>2/20/2020</a:t>
             </a:fld>
             <a:endParaRPr lang="en-US"/>
           </a:p>
@@ -1140,7 +1142,7 @@
           <a:p>
             <a:fld id="{1FF31F5F-B693-484B-AA3D-F43312839E9C}" type="datetimeFigureOut">
               <a:rPr lang="en-US" smtClean="0"/>
-              <a:t>2/18/2020</a:t>
+              <a:t>2/20/2020</a:t>
             </a:fld>
             <a:endParaRPr lang="en-US"/>
           </a:p>
@@ -1405,7 +1407,7 @@
           <a:p>
             <a:fld id="{1FF31F5F-B693-484B-AA3D-F43312839E9C}" type="datetimeFigureOut">
               <a:rPr lang="en-US" smtClean="0"/>
-              <a:t>2/18/2020</a:t>
+              <a:t>2/20/2020</a:t>
             </a:fld>
             <a:endParaRPr lang="en-US"/>
           </a:p>
@@ -1817,7 +1819,7 @@
           <a:p>
             <a:fld id="{1FF31F5F-B693-484B-AA3D-F43312839E9C}" type="datetimeFigureOut">
               <a:rPr lang="en-US" smtClean="0"/>
-              <a:t>2/18/2020</a:t>
+              <a:t>2/20/2020</a:t>
             </a:fld>
             <a:endParaRPr lang="en-US"/>
           </a:p>
@@ -1958,7 +1960,7 @@
           <a:p>
             <a:fld id="{1FF31F5F-B693-484B-AA3D-F43312839E9C}" type="datetimeFigureOut">
               <a:rPr lang="en-US" smtClean="0"/>
-              <a:t>2/18/2020</a:t>
+              <a:t>2/20/2020</a:t>
             </a:fld>
             <a:endParaRPr lang="en-US"/>
           </a:p>
@@ -2071,7 +2073,7 @@
           <a:p>
             <a:fld id="{1FF31F5F-B693-484B-AA3D-F43312839E9C}" type="datetimeFigureOut">
               <a:rPr lang="en-US" smtClean="0"/>
-              <a:t>2/18/2020</a:t>
+              <a:t>2/20/2020</a:t>
             </a:fld>
             <a:endParaRPr lang="en-US"/>
           </a:p>
@@ -2382,7 +2384,7 @@
           <a:p>
             <a:fld id="{1FF31F5F-B693-484B-AA3D-F43312839E9C}" type="datetimeFigureOut">
               <a:rPr lang="en-US" smtClean="0"/>
-              <a:t>2/18/2020</a:t>
+              <a:t>2/20/2020</a:t>
             </a:fld>
             <a:endParaRPr lang="en-US"/>
           </a:p>
@@ -2670,7 +2672,7 @@
           <a:p>
             <a:fld id="{1FF31F5F-B693-484B-AA3D-F43312839E9C}" type="datetimeFigureOut">
               <a:rPr lang="en-US" smtClean="0"/>
-              <a:t>2/18/2020</a:t>
+              <a:t>2/20/2020</a:t>
             </a:fld>
             <a:endParaRPr lang="en-US"/>
           </a:p>
@@ -2911,7 +2913,7 @@
           <a:p>
             <a:fld id="{1FF31F5F-B693-484B-AA3D-F43312839E9C}" type="datetimeFigureOut">
               <a:rPr lang="en-US" smtClean="0"/>
-              <a:t>2/18/2020</a:t>
+              <a:t>2/20/2020</a:t>
             </a:fld>
             <a:endParaRPr lang="en-US"/>
           </a:p>
@@ -5754,31 +5756,6 @@
           </mc:Fallback>
         </mc:AlternateContent>
       </p:grpSp>
-      <p:sp>
-        <p:nvSpPr>
-          <p:cNvPr id="2" name="Title 1">
-            <a:extLst>
-              <a:ext uri="{FF2B5EF4-FFF2-40B4-BE49-F238E27FC236}">
-                <a16:creationId xmlns:a16="http://schemas.microsoft.com/office/drawing/2014/main" id="{C04B4403-4957-47E5-9EEC-63EEFA320515}"/>
-              </a:ext>
-            </a:extLst>
-          </p:cNvPr>
-          <p:cNvSpPr>
-            <a:spLocks noGrp="1"/>
-          </p:cNvSpPr>
-          <p:nvPr>
-            <p:ph type="ctrTitle"/>
-          </p:nvPr>
-        </p:nvSpPr>
-        <p:spPr/>
-        <p:txBody>
-          <a:bodyPr/>
-          <a:lstStyle/>
-          <a:p>
-            <a:endParaRPr lang="en-US" dirty="0"/>
-          </a:p>
-        </p:txBody>
-      </p:sp>
     </p:spTree>
     <p:extLst>
       <p:ext uri="{BB962C8B-B14F-4D97-AF65-F5344CB8AC3E}">
@@ -7470,6 +7447,3066 @@
           <p:cNvPr id="4" name="Group 3">
             <a:extLst>
               <a:ext uri="{FF2B5EF4-FFF2-40B4-BE49-F238E27FC236}">
+                <a16:creationId xmlns:a16="http://schemas.microsoft.com/office/drawing/2014/main" id="{F752162E-4891-46B3-B35B-5357E0DE6625}"/>
+              </a:ext>
+            </a:extLst>
+          </p:cNvPr>
+          <p:cNvGrpSpPr/>
+          <p:nvPr/>
+        </p:nvGrpSpPr>
+        <p:grpSpPr>
+          <a:xfrm>
+            <a:off x="4169410" y="2139950"/>
+            <a:ext cx="3853180" cy="2578100"/>
+            <a:chOff x="0" y="0"/>
+            <a:chExt cx="3853180" cy="2578100"/>
+          </a:xfrm>
+        </p:grpSpPr>
+        <p:grpSp>
+          <p:nvGrpSpPr>
+            <p:cNvPr id="5" name="Group 4">
+              <a:extLst>
+                <a:ext uri="{FF2B5EF4-FFF2-40B4-BE49-F238E27FC236}">
+                  <a16:creationId xmlns:a16="http://schemas.microsoft.com/office/drawing/2014/main" id="{163F928C-4781-4B61-83BC-23CA6A745F7F}"/>
+                </a:ext>
+              </a:extLst>
+            </p:cNvPr>
+            <p:cNvGrpSpPr/>
+            <p:nvPr/>
+          </p:nvGrpSpPr>
+          <p:grpSpPr>
+            <a:xfrm>
+              <a:off x="0" y="0"/>
+              <a:ext cx="3853180" cy="2578100"/>
+              <a:chOff x="0" y="0"/>
+              <a:chExt cx="3853180" cy="2578100"/>
+            </a:xfrm>
+          </p:grpSpPr>
+          <p:grpSp>
+            <p:nvGrpSpPr>
+              <p:cNvPr id="7" name="Group 6">
+                <a:extLst>
+                  <a:ext uri="{FF2B5EF4-FFF2-40B4-BE49-F238E27FC236}">
+                    <a16:creationId xmlns:a16="http://schemas.microsoft.com/office/drawing/2014/main" id="{9ABBBC23-E058-4832-971A-C3E7E1D3AE29}"/>
+                  </a:ext>
+                </a:extLst>
+              </p:cNvPr>
+              <p:cNvGrpSpPr/>
+              <p:nvPr/>
+            </p:nvGrpSpPr>
+            <p:grpSpPr>
+              <a:xfrm>
+                <a:off x="0" y="0"/>
+                <a:ext cx="3853180" cy="2578100"/>
+                <a:chOff x="0" y="0"/>
+                <a:chExt cx="3853180" cy="2578100"/>
+              </a:xfrm>
+            </p:grpSpPr>
+            <p:cxnSp>
+              <p:nvCxnSpPr>
+                <p:cNvPr id="12" name="Straight Arrow Connector 11">
+                  <a:extLst>
+                    <a:ext uri="{FF2B5EF4-FFF2-40B4-BE49-F238E27FC236}">
+                      <a16:creationId xmlns:a16="http://schemas.microsoft.com/office/drawing/2014/main" id="{408C5306-DC9F-4C30-808D-0E56B291F770}"/>
+                    </a:ext>
+                  </a:extLst>
+                </p:cNvPr>
+                <p:cNvCxnSpPr/>
+                <p:nvPr/>
+              </p:nvCxnSpPr>
+              <p:spPr>
+                <a:xfrm rot="16200000" flipV="1">
+                  <a:off x="1231900" y="717550"/>
+                  <a:ext cx="1370965" cy="3732"/>
+                </a:xfrm>
+                <a:prstGeom prst="straightConnector1">
+                  <a:avLst/>
+                </a:prstGeom>
+                <a:ln w="19050">
+                  <a:tailEnd type="triangle"/>
+                </a:ln>
+              </p:spPr>
+              <p:style>
+                <a:lnRef idx="1">
+                  <a:schemeClr val="dk1"/>
+                </a:lnRef>
+                <a:fillRef idx="0">
+                  <a:schemeClr val="dk1"/>
+                </a:fillRef>
+                <a:effectRef idx="0">
+                  <a:schemeClr val="dk1"/>
+                </a:effectRef>
+                <a:fontRef idx="minor">
+                  <a:schemeClr val="tx1"/>
+                </a:fontRef>
+              </p:style>
+            </p:cxnSp>
+            <p:cxnSp>
+              <p:nvCxnSpPr>
+                <p:cNvPr id="13" name="Straight Arrow Connector 12">
+                  <a:extLst>
+                    <a:ext uri="{FF2B5EF4-FFF2-40B4-BE49-F238E27FC236}">
+                      <a16:creationId xmlns:a16="http://schemas.microsoft.com/office/drawing/2014/main" id="{BE4A97D2-1D67-47B3-B6BA-72963CF7B089}"/>
+                    </a:ext>
+                  </a:extLst>
+                </p:cNvPr>
+                <p:cNvCxnSpPr/>
+                <p:nvPr/>
+              </p:nvCxnSpPr>
+              <p:spPr>
+                <a:xfrm rot="1800000" flipV="1">
+                  <a:off x="1778000" y="1885950"/>
+                  <a:ext cx="2075180" cy="17780"/>
+                </a:xfrm>
+                <a:prstGeom prst="straightConnector1">
+                  <a:avLst/>
+                </a:prstGeom>
+                <a:ln w="19050">
+                  <a:tailEnd type="triangle"/>
+                </a:ln>
+              </p:spPr>
+              <p:style>
+                <a:lnRef idx="1">
+                  <a:schemeClr val="dk1"/>
+                </a:lnRef>
+                <a:fillRef idx="0">
+                  <a:schemeClr val="dk1"/>
+                </a:fillRef>
+                <a:effectRef idx="0">
+                  <a:schemeClr val="dk1"/>
+                </a:effectRef>
+                <a:fontRef idx="minor">
+                  <a:schemeClr val="tx1"/>
+                </a:fontRef>
+              </p:style>
+            </p:cxnSp>
+            <p:cxnSp>
+              <p:nvCxnSpPr>
+                <p:cNvPr id="14" name="Straight Arrow Connector 13">
+                  <a:extLst>
+                    <a:ext uri="{FF2B5EF4-FFF2-40B4-BE49-F238E27FC236}">
+                      <a16:creationId xmlns:a16="http://schemas.microsoft.com/office/drawing/2014/main" id="{A0E60013-98C2-4201-B842-391307857228}"/>
+                    </a:ext>
+                  </a:extLst>
+                </p:cNvPr>
+                <p:cNvCxnSpPr/>
+                <p:nvPr/>
+              </p:nvCxnSpPr>
+              <p:spPr>
+                <a:xfrm rot="9000000" flipV="1">
+                  <a:off x="0" y="1898650"/>
+                  <a:ext cx="2075180" cy="17780"/>
+                </a:xfrm>
+                <a:prstGeom prst="straightConnector1">
+                  <a:avLst/>
+                </a:prstGeom>
+                <a:ln w="19050">
+                  <a:tailEnd type="triangle"/>
+                </a:ln>
+              </p:spPr>
+              <p:style>
+                <a:lnRef idx="1">
+                  <a:schemeClr val="dk1"/>
+                </a:lnRef>
+                <a:fillRef idx="0">
+                  <a:schemeClr val="dk1"/>
+                </a:fillRef>
+                <a:effectRef idx="0">
+                  <a:schemeClr val="dk1"/>
+                </a:effectRef>
+                <a:fontRef idx="minor">
+                  <a:schemeClr val="tx1"/>
+                </a:fontRef>
+              </p:style>
+            </p:cxnSp>
+            <p:sp>
+              <p:nvSpPr>
+                <p:cNvPr id="15" name="Oval 14">
+                  <a:extLst>
+                    <a:ext uri="{FF2B5EF4-FFF2-40B4-BE49-F238E27FC236}">
+                      <a16:creationId xmlns:a16="http://schemas.microsoft.com/office/drawing/2014/main" id="{0207C1C1-DEF1-418D-908E-AF3EC88D1EDF}"/>
+                    </a:ext>
+                  </a:extLst>
+                </p:cNvPr>
+                <p:cNvSpPr/>
+                <p:nvPr/>
+              </p:nvSpPr>
+              <p:spPr>
+                <a:xfrm>
+                  <a:off x="1854200" y="412750"/>
+                  <a:ext cx="133350" cy="133350"/>
+                </a:xfrm>
+                <a:prstGeom prst="ellipse">
+                  <a:avLst/>
+                </a:prstGeom>
+                <a:solidFill>
+                  <a:srgbClr val="00B050"/>
+                </a:solidFill>
+              </p:spPr>
+              <p:style>
+                <a:lnRef idx="2">
+                  <a:schemeClr val="accent1">
+                    <a:shade val="50000"/>
+                  </a:schemeClr>
+                </a:lnRef>
+                <a:fillRef idx="1">
+                  <a:schemeClr val="accent1"/>
+                </a:fillRef>
+                <a:effectRef idx="0">
+                  <a:schemeClr val="accent1"/>
+                </a:effectRef>
+                <a:fontRef idx="minor">
+                  <a:schemeClr val="lt1"/>
+                </a:fontRef>
+              </p:style>
+              <p:txBody>
+                <a:bodyPr rot="0" spcFirstLastPara="0" vert="horz" wrap="square" lIns="91440" tIns="45720" rIns="91440" bIns="45720" numCol="1" spcCol="0" rtlCol="0" fromWordArt="0" anchor="ctr" anchorCtr="0" forceAA="0" compatLnSpc="1">
+                  <a:prstTxWarp prst="textNoShape">
+                    <a:avLst/>
+                  </a:prstTxWarp>
+                  <a:noAutofit/>
+                </a:bodyPr>
+                <a:lstStyle/>
+                <a:p>
+                  <a:endParaRPr lang="en-US"/>
+                </a:p>
+              </p:txBody>
+            </p:sp>
+            <p:sp>
+              <p:nvSpPr>
+                <p:cNvPr id="16" name="Oval 15">
+                  <a:extLst>
+                    <a:ext uri="{FF2B5EF4-FFF2-40B4-BE49-F238E27FC236}">
+                      <a16:creationId xmlns:a16="http://schemas.microsoft.com/office/drawing/2014/main" id="{FBBCC1F1-F7B1-4CE5-89B8-7AA23EEAD1B2}"/>
+                    </a:ext>
+                  </a:extLst>
+                </p:cNvPr>
+                <p:cNvSpPr/>
+                <p:nvPr/>
+              </p:nvSpPr>
+              <p:spPr>
+                <a:xfrm>
+                  <a:off x="2921000" y="1898650"/>
+                  <a:ext cx="133350" cy="133350"/>
+                </a:xfrm>
+                <a:prstGeom prst="ellipse">
+                  <a:avLst/>
+                </a:prstGeom>
+                <a:solidFill>
+                  <a:srgbClr val="FFC000"/>
+                </a:solidFill>
+              </p:spPr>
+              <p:style>
+                <a:lnRef idx="2">
+                  <a:schemeClr val="accent1">
+                    <a:shade val="50000"/>
+                  </a:schemeClr>
+                </a:lnRef>
+                <a:fillRef idx="1">
+                  <a:schemeClr val="accent1"/>
+                </a:fillRef>
+                <a:effectRef idx="0">
+                  <a:schemeClr val="accent1"/>
+                </a:effectRef>
+                <a:fontRef idx="minor">
+                  <a:schemeClr val="lt1"/>
+                </a:fontRef>
+              </p:style>
+              <p:txBody>
+                <a:bodyPr rot="0" spcFirstLastPara="0" vert="horz" wrap="square" lIns="91440" tIns="45720" rIns="91440" bIns="45720" numCol="1" spcCol="0" rtlCol="0" fromWordArt="0" anchor="ctr" anchorCtr="0" forceAA="0" compatLnSpc="1">
+                  <a:prstTxWarp prst="textNoShape">
+                    <a:avLst/>
+                  </a:prstTxWarp>
+                  <a:noAutofit/>
+                </a:bodyPr>
+                <a:lstStyle/>
+                <a:p>
+                  <a:endParaRPr lang="en-US"/>
+                </a:p>
+              </p:txBody>
+            </p:sp>
+            <p:sp>
+              <p:nvSpPr>
+                <p:cNvPr id="17" name="Oval 16">
+                  <a:extLst>
+                    <a:ext uri="{FF2B5EF4-FFF2-40B4-BE49-F238E27FC236}">
+                      <a16:creationId xmlns:a16="http://schemas.microsoft.com/office/drawing/2014/main" id="{07BF69D3-7490-4DAC-A548-544847C5B0A7}"/>
+                    </a:ext>
+                  </a:extLst>
+                </p:cNvPr>
+                <p:cNvSpPr/>
+                <p:nvPr/>
+              </p:nvSpPr>
+              <p:spPr>
+                <a:xfrm>
+                  <a:off x="876300" y="996950"/>
+                  <a:ext cx="133350" cy="133350"/>
+                </a:xfrm>
+                <a:prstGeom prst="ellipse">
+                  <a:avLst/>
+                </a:prstGeom>
+                <a:solidFill>
+                  <a:srgbClr val="00B050"/>
+                </a:solidFill>
+              </p:spPr>
+              <p:style>
+                <a:lnRef idx="2">
+                  <a:schemeClr val="accent1">
+                    <a:shade val="50000"/>
+                  </a:schemeClr>
+                </a:lnRef>
+                <a:fillRef idx="1">
+                  <a:schemeClr val="accent1"/>
+                </a:fillRef>
+                <a:effectRef idx="0">
+                  <a:schemeClr val="accent1"/>
+                </a:effectRef>
+                <a:fontRef idx="minor">
+                  <a:schemeClr val="lt1"/>
+                </a:fontRef>
+              </p:style>
+              <p:txBody>
+                <a:bodyPr rot="0" spcFirstLastPara="0" vert="horz" wrap="square" lIns="91440" tIns="45720" rIns="91440" bIns="45720" numCol="1" spcCol="0" rtlCol="0" fromWordArt="0" anchor="ctr" anchorCtr="0" forceAA="0" compatLnSpc="1">
+                  <a:prstTxWarp prst="textNoShape">
+                    <a:avLst/>
+                  </a:prstTxWarp>
+                  <a:noAutofit/>
+                </a:bodyPr>
+                <a:lstStyle/>
+                <a:p>
+                  <a:endParaRPr lang="en-US"/>
+                </a:p>
+              </p:txBody>
+            </p:sp>
+            <p:sp>
+              <p:nvSpPr>
+                <p:cNvPr id="18" name="Oval 17">
+                  <a:extLst>
+                    <a:ext uri="{FF2B5EF4-FFF2-40B4-BE49-F238E27FC236}">
+                      <a16:creationId xmlns:a16="http://schemas.microsoft.com/office/drawing/2014/main" id="{861BDDCD-3693-46A1-84BA-49CBBF9C3295}"/>
+                    </a:ext>
+                  </a:extLst>
+                </p:cNvPr>
+                <p:cNvSpPr/>
+                <p:nvPr/>
+              </p:nvSpPr>
+              <p:spPr>
+                <a:xfrm>
+                  <a:off x="876300" y="1885950"/>
+                  <a:ext cx="133350" cy="133350"/>
+                </a:xfrm>
+                <a:prstGeom prst="ellipse">
+                  <a:avLst/>
+                </a:prstGeom>
+                <a:solidFill>
+                  <a:srgbClr val="00B050"/>
+                </a:solidFill>
+              </p:spPr>
+              <p:style>
+                <a:lnRef idx="2">
+                  <a:schemeClr val="accent1">
+                    <a:shade val="50000"/>
+                  </a:schemeClr>
+                </a:lnRef>
+                <a:fillRef idx="1">
+                  <a:schemeClr val="accent1"/>
+                </a:fillRef>
+                <a:effectRef idx="0">
+                  <a:schemeClr val="accent1"/>
+                </a:effectRef>
+                <a:fontRef idx="minor">
+                  <a:schemeClr val="lt1"/>
+                </a:fontRef>
+              </p:style>
+              <p:txBody>
+                <a:bodyPr rot="0" spcFirstLastPara="0" vert="horz" wrap="square" lIns="91440" tIns="45720" rIns="91440" bIns="45720" numCol="1" spcCol="0" rtlCol="0" fromWordArt="0" anchor="ctr" anchorCtr="0" forceAA="0" compatLnSpc="1">
+                  <a:prstTxWarp prst="textNoShape">
+                    <a:avLst/>
+                  </a:prstTxWarp>
+                  <a:noAutofit/>
+                </a:bodyPr>
+                <a:lstStyle/>
+                <a:p>
+                  <a:endParaRPr lang="en-US"/>
+                </a:p>
+              </p:txBody>
+            </p:sp>
+            <p:sp>
+              <p:nvSpPr>
+                <p:cNvPr id="19" name="Oval 18">
+                  <a:extLst>
+                    <a:ext uri="{FF2B5EF4-FFF2-40B4-BE49-F238E27FC236}">
+                      <a16:creationId xmlns:a16="http://schemas.microsoft.com/office/drawing/2014/main" id="{587DE13C-D4A4-4F64-B17C-CA2A3E4B0B33}"/>
+                    </a:ext>
+                  </a:extLst>
+                </p:cNvPr>
+                <p:cNvSpPr/>
+                <p:nvPr/>
+              </p:nvSpPr>
+              <p:spPr>
+                <a:xfrm>
+                  <a:off x="1898650" y="1555750"/>
+                  <a:ext cx="133350" cy="133350"/>
+                </a:xfrm>
+                <a:prstGeom prst="ellipse">
+                  <a:avLst/>
+                </a:prstGeom>
+                <a:solidFill>
+                  <a:srgbClr val="FFC000"/>
+                </a:solidFill>
+              </p:spPr>
+              <p:style>
+                <a:lnRef idx="2">
+                  <a:schemeClr val="accent1">
+                    <a:shade val="50000"/>
+                  </a:schemeClr>
+                </a:lnRef>
+                <a:fillRef idx="1">
+                  <a:schemeClr val="accent1"/>
+                </a:fillRef>
+                <a:effectRef idx="0">
+                  <a:schemeClr val="accent1"/>
+                </a:effectRef>
+                <a:fontRef idx="minor">
+                  <a:schemeClr val="lt1"/>
+                </a:fontRef>
+              </p:style>
+              <p:txBody>
+                <a:bodyPr rot="0" spcFirstLastPara="0" vert="horz" wrap="square" lIns="91440" tIns="45720" rIns="91440" bIns="45720" numCol="1" spcCol="0" rtlCol="0" fromWordArt="0" anchor="ctr" anchorCtr="0" forceAA="0" compatLnSpc="1">
+                  <a:prstTxWarp prst="textNoShape">
+                    <a:avLst/>
+                  </a:prstTxWarp>
+                  <a:noAutofit/>
+                </a:bodyPr>
+                <a:lstStyle/>
+                <a:p>
+                  <a:endParaRPr lang="en-US"/>
+                </a:p>
+              </p:txBody>
+            </p:sp>
+            <p:sp>
+              <p:nvSpPr>
+                <p:cNvPr id="20" name="Oval 19">
+                  <a:extLst>
+                    <a:ext uri="{FF2B5EF4-FFF2-40B4-BE49-F238E27FC236}">
+                      <a16:creationId xmlns:a16="http://schemas.microsoft.com/office/drawing/2014/main" id="{74834F77-5CBC-407D-8AB3-6BD2F55BBCE6}"/>
+                    </a:ext>
+                  </a:extLst>
+                </p:cNvPr>
+                <p:cNvSpPr/>
+                <p:nvPr/>
+              </p:nvSpPr>
+              <p:spPr>
+                <a:xfrm>
+                  <a:off x="1905000" y="2444750"/>
+                  <a:ext cx="133350" cy="133350"/>
+                </a:xfrm>
+                <a:prstGeom prst="ellipse">
+                  <a:avLst/>
+                </a:prstGeom>
+                <a:solidFill>
+                  <a:srgbClr val="FFC000"/>
+                </a:solidFill>
+              </p:spPr>
+              <p:style>
+                <a:lnRef idx="2">
+                  <a:schemeClr val="accent1">
+                    <a:shade val="50000"/>
+                  </a:schemeClr>
+                </a:lnRef>
+                <a:fillRef idx="1">
+                  <a:schemeClr val="accent1"/>
+                </a:fillRef>
+                <a:effectRef idx="0">
+                  <a:schemeClr val="accent1"/>
+                </a:effectRef>
+                <a:fontRef idx="minor">
+                  <a:schemeClr val="lt1"/>
+                </a:fontRef>
+              </p:style>
+              <p:txBody>
+                <a:bodyPr rot="0" spcFirstLastPara="0" vert="horz" wrap="square" lIns="91440" tIns="45720" rIns="91440" bIns="45720" numCol="1" spcCol="0" rtlCol="0" fromWordArt="0" anchor="ctr" anchorCtr="0" forceAA="0" compatLnSpc="1">
+                  <a:prstTxWarp prst="textNoShape">
+                    <a:avLst/>
+                  </a:prstTxWarp>
+                  <a:noAutofit/>
+                </a:bodyPr>
+                <a:lstStyle/>
+                <a:p>
+                  <a:endParaRPr lang="en-US"/>
+                </a:p>
+              </p:txBody>
+            </p:sp>
+            <p:cxnSp>
+              <p:nvCxnSpPr>
+                <p:cNvPr id="21" name="Straight Arrow Connector 20">
+                  <a:extLst>
+                    <a:ext uri="{FF2B5EF4-FFF2-40B4-BE49-F238E27FC236}">
+                      <a16:creationId xmlns:a16="http://schemas.microsoft.com/office/drawing/2014/main" id="{7C73CD45-F0FE-4611-B624-3631004277F6}"/>
+                    </a:ext>
+                  </a:extLst>
+                </p:cNvPr>
+                <p:cNvCxnSpPr/>
+                <p:nvPr/>
+              </p:nvCxnSpPr>
+              <p:spPr>
+                <a:xfrm rot="1800000" flipV="1">
+                  <a:off x="1924050" y="717550"/>
+                  <a:ext cx="1083945" cy="45085"/>
+                </a:xfrm>
+                <a:prstGeom prst="straightConnector1">
+                  <a:avLst/>
+                </a:prstGeom>
+                <a:ln w="19050">
+                  <a:prstDash val="sysDot"/>
+                  <a:headEnd type="none" w="med" len="med"/>
+                  <a:tailEnd type="none" w="med" len="med"/>
+                </a:ln>
+              </p:spPr>
+              <p:style>
+                <a:lnRef idx="1">
+                  <a:schemeClr val="dk1"/>
+                </a:lnRef>
+                <a:fillRef idx="0">
+                  <a:schemeClr val="dk1"/>
+                </a:fillRef>
+                <a:effectRef idx="0">
+                  <a:schemeClr val="dk1"/>
+                </a:effectRef>
+                <a:fontRef idx="minor">
+                  <a:schemeClr val="tx1"/>
+                </a:fontRef>
+              </p:style>
+            </p:cxnSp>
+            <p:cxnSp>
+              <p:nvCxnSpPr>
+                <p:cNvPr id="22" name="Straight Arrow Connector 21">
+                  <a:extLst>
+                    <a:ext uri="{FF2B5EF4-FFF2-40B4-BE49-F238E27FC236}">
+                      <a16:creationId xmlns:a16="http://schemas.microsoft.com/office/drawing/2014/main" id="{46EDA7CF-E37F-414D-BE4C-5894047A73BB}"/>
+                    </a:ext>
+                  </a:extLst>
+                </p:cNvPr>
+                <p:cNvCxnSpPr/>
+                <p:nvPr/>
+              </p:nvCxnSpPr>
+              <p:spPr>
+                <a:xfrm rot="1800000" flipV="1">
+                  <a:off x="914400" y="1327150"/>
+                  <a:ext cx="1083945" cy="45085"/>
+                </a:xfrm>
+                <a:prstGeom prst="straightConnector1">
+                  <a:avLst/>
+                </a:prstGeom>
+                <a:ln w="19050">
+                  <a:prstDash val="sysDot"/>
+                  <a:headEnd type="none" w="med" len="med"/>
+                  <a:tailEnd type="none" w="med" len="med"/>
+                </a:ln>
+              </p:spPr>
+              <p:style>
+                <a:lnRef idx="1">
+                  <a:schemeClr val="dk1"/>
+                </a:lnRef>
+                <a:fillRef idx="0">
+                  <a:schemeClr val="dk1"/>
+                </a:fillRef>
+                <a:effectRef idx="0">
+                  <a:schemeClr val="dk1"/>
+                </a:effectRef>
+                <a:fontRef idx="minor">
+                  <a:schemeClr val="tx1"/>
+                </a:fontRef>
+              </p:style>
+            </p:cxnSp>
+            <p:cxnSp>
+              <p:nvCxnSpPr>
+                <p:cNvPr id="23" name="Straight Arrow Connector 22">
+                  <a:extLst>
+                    <a:ext uri="{FF2B5EF4-FFF2-40B4-BE49-F238E27FC236}">
+                      <a16:creationId xmlns:a16="http://schemas.microsoft.com/office/drawing/2014/main" id="{797A6BB4-C15E-4A4D-8642-4CC55ECCC208}"/>
+                    </a:ext>
+                  </a:extLst>
+                </p:cNvPr>
+                <p:cNvCxnSpPr/>
+                <p:nvPr/>
+              </p:nvCxnSpPr>
+              <p:spPr>
+                <a:xfrm rot="16200000" flipV="1">
+                  <a:off x="552450" y="1466850"/>
+                  <a:ext cx="763905" cy="14605"/>
+                </a:xfrm>
+                <a:prstGeom prst="straightConnector1">
+                  <a:avLst/>
+                </a:prstGeom>
+                <a:ln w="19050">
+                  <a:prstDash val="sysDot"/>
+                  <a:headEnd type="none" w="med" len="med"/>
+                  <a:tailEnd type="none" w="med" len="med"/>
+                </a:ln>
+              </p:spPr>
+              <p:style>
+                <a:lnRef idx="1">
+                  <a:schemeClr val="dk1"/>
+                </a:lnRef>
+                <a:fillRef idx="0">
+                  <a:schemeClr val="dk1"/>
+                </a:fillRef>
+                <a:effectRef idx="0">
+                  <a:schemeClr val="dk1"/>
+                </a:effectRef>
+                <a:fontRef idx="minor">
+                  <a:schemeClr val="tx1"/>
+                </a:fontRef>
+              </p:style>
+            </p:cxnSp>
+            <p:cxnSp>
+              <p:nvCxnSpPr>
+                <p:cNvPr id="24" name="Straight Arrow Connector 23">
+                  <a:extLst>
+                    <a:ext uri="{FF2B5EF4-FFF2-40B4-BE49-F238E27FC236}">
+                      <a16:creationId xmlns:a16="http://schemas.microsoft.com/office/drawing/2014/main" id="{7E7DE57C-7BAD-41C6-A91B-6FE12FAFB922}"/>
+                    </a:ext>
+                  </a:extLst>
+                </p:cNvPr>
+                <p:cNvCxnSpPr/>
+                <p:nvPr/>
+              </p:nvCxnSpPr>
+              <p:spPr>
+                <a:xfrm rot="16200000" flipV="1">
+                  <a:off x="2603500" y="1511300"/>
+                  <a:ext cx="763905" cy="14605"/>
+                </a:xfrm>
+                <a:prstGeom prst="straightConnector1">
+                  <a:avLst/>
+                </a:prstGeom>
+                <a:ln w="19050">
+                  <a:prstDash val="sysDot"/>
+                  <a:headEnd type="none" w="med" len="med"/>
+                  <a:tailEnd type="none" w="med" len="med"/>
+                </a:ln>
+              </p:spPr>
+              <p:style>
+                <a:lnRef idx="1">
+                  <a:schemeClr val="dk1"/>
+                </a:lnRef>
+                <a:fillRef idx="0">
+                  <a:schemeClr val="dk1"/>
+                </a:fillRef>
+                <a:effectRef idx="0">
+                  <a:schemeClr val="dk1"/>
+                </a:effectRef>
+                <a:fontRef idx="minor">
+                  <a:schemeClr val="tx1"/>
+                </a:fontRef>
+              </p:style>
+            </p:cxnSp>
+            <p:cxnSp>
+              <p:nvCxnSpPr>
+                <p:cNvPr id="25" name="Straight Arrow Connector 24">
+                  <a:extLst>
+                    <a:ext uri="{FF2B5EF4-FFF2-40B4-BE49-F238E27FC236}">
+                      <a16:creationId xmlns:a16="http://schemas.microsoft.com/office/drawing/2014/main" id="{392E0D93-0604-4134-9B3A-B3C9B5706B63}"/>
+                    </a:ext>
+                  </a:extLst>
+                </p:cNvPr>
+                <p:cNvCxnSpPr/>
+                <p:nvPr/>
+              </p:nvCxnSpPr>
+              <p:spPr>
+                <a:xfrm rot="1800000" flipV="1">
+                  <a:off x="908050" y="2216150"/>
+                  <a:ext cx="1083945" cy="45085"/>
+                </a:xfrm>
+                <a:prstGeom prst="straightConnector1">
+                  <a:avLst/>
+                </a:prstGeom>
+                <a:ln w="19050">
+                  <a:prstDash val="sysDot"/>
+                  <a:headEnd type="none" w="med" len="med"/>
+                  <a:tailEnd type="none" w="med" len="med"/>
+                </a:ln>
+              </p:spPr>
+              <p:style>
+                <a:lnRef idx="1">
+                  <a:schemeClr val="dk1"/>
+                </a:lnRef>
+                <a:fillRef idx="0">
+                  <a:schemeClr val="dk1"/>
+                </a:fillRef>
+                <a:effectRef idx="0">
+                  <a:schemeClr val="dk1"/>
+                </a:effectRef>
+                <a:fontRef idx="minor">
+                  <a:schemeClr val="tx1"/>
+                </a:fontRef>
+              </p:style>
+            </p:cxnSp>
+            <p:cxnSp>
+              <p:nvCxnSpPr>
+                <p:cNvPr id="26" name="Straight Arrow Connector 25">
+                  <a:extLst>
+                    <a:ext uri="{FF2B5EF4-FFF2-40B4-BE49-F238E27FC236}">
+                      <a16:creationId xmlns:a16="http://schemas.microsoft.com/office/drawing/2014/main" id="{CE1AB279-2388-4FF2-97B8-640928C339A2}"/>
+                    </a:ext>
+                  </a:extLst>
+                </p:cNvPr>
+                <p:cNvCxnSpPr/>
+                <p:nvPr/>
+              </p:nvCxnSpPr>
+              <p:spPr>
+                <a:xfrm rot="19800000">
+                  <a:off x="1962150" y="2209800"/>
+                  <a:ext cx="1084476" cy="45719"/>
+                </a:xfrm>
+                <a:prstGeom prst="straightConnector1">
+                  <a:avLst/>
+                </a:prstGeom>
+                <a:ln w="19050">
+                  <a:prstDash val="sysDot"/>
+                  <a:headEnd type="none" w="med" len="med"/>
+                  <a:tailEnd type="none" w="med" len="med"/>
+                </a:ln>
+              </p:spPr>
+              <p:style>
+                <a:lnRef idx="1">
+                  <a:schemeClr val="dk1"/>
+                </a:lnRef>
+                <a:fillRef idx="0">
+                  <a:schemeClr val="dk1"/>
+                </a:fillRef>
+                <a:effectRef idx="0">
+                  <a:schemeClr val="dk1"/>
+                </a:effectRef>
+                <a:fontRef idx="minor">
+                  <a:schemeClr val="tx1"/>
+                </a:fontRef>
+              </p:style>
+            </p:cxnSp>
+            <p:cxnSp>
+              <p:nvCxnSpPr>
+                <p:cNvPr id="27" name="Straight Arrow Connector 26">
+                  <a:extLst>
+                    <a:ext uri="{FF2B5EF4-FFF2-40B4-BE49-F238E27FC236}">
+                      <a16:creationId xmlns:a16="http://schemas.microsoft.com/office/drawing/2014/main" id="{997DB86E-0B3A-445D-AB5F-34C23FF2E9AC}"/>
+                    </a:ext>
+                  </a:extLst>
+                </p:cNvPr>
+                <p:cNvCxnSpPr/>
+                <p:nvPr/>
+              </p:nvCxnSpPr>
+              <p:spPr>
+                <a:xfrm rot="19800000">
+                  <a:off x="1949450" y="1358900"/>
+                  <a:ext cx="1083945" cy="45085"/>
+                </a:xfrm>
+                <a:prstGeom prst="straightConnector1">
+                  <a:avLst/>
+                </a:prstGeom>
+                <a:ln w="19050">
+                  <a:prstDash val="sysDot"/>
+                  <a:headEnd type="none" w="med" len="med"/>
+                  <a:tailEnd type="none" w="med" len="med"/>
+                </a:ln>
+              </p:spPr>
+              <p:style>
+                <a:lnRef idx="1">
+                  <a:schemeClr val="dk1"/>
+                </a:lnRef>
+                <a:fillRef idx="0">
+                  <a:schemeClr val="dk1"/>
+                </a:fillRef>
+                <a:effectRef idx="0">
+                  <a:schemeClr val="dk1"/>
+                </a:effectRef>
+                <a:fontRef idx="minor">
+                  <a:schemeClr val="tx1"/>
+                </a:fontRef>
+              </p:style>
+            </p:cxnSp>
+            <p:cxnSp>
+              <p:nvCxnSpPr>
+                <p:cNvPr id="28" name="Straight Arrow Connector 27">
+                  <a:extLst>
+                    <a:ext uri="{FF2B5EF4-FFF2-40B4-BE49-F238E27FC236}">
+                      <a16:creationId xmlns:a16="http://schemas.microsoft.com/office/drawing/2014/main" id="{A8CD9397-873F-496B-AB85-9F4DC1014221}"/>
+                    </a:ext>
+                  </a:extLst>
+                </p:cNvPr>
+                <p:cNvCxnSpPr/>
+                <p:nvPr/>
+              </p:nvCxnSpPr>
+              <p:spPr>
+                <a:xfrm rot="19800000">
+                  <a:off x="895350" y="736600"/>
+                  <a:ext cx="1084476" cy="45719"/>
+                </a:xfrm>
+                <a:prstGeom prst="straightConnector1">
+                  <a:avLst/>
+                </a:prstGeom>
+                <a:ln w="19050">
+                  <a:prstDash val="sysDot"/>
+                  <a:headEnd type="none" w="med" len="med"/>
+                  <a:tailEnd type="none" w="med" len="med"/>
+                </a:ln>
+              </p:spPr>
+              <p:style>
+                <a:lnRef idx="1">
+                  <a:schemeClr val="dk1"/>
+                </a:lnRef>
+                <a:fillRef idx="0">
+                  <a:schemeClr val="dk1"/>
+                </a:fillRef>
+                <a:effectRef idx="0">
+                  <a:schemeClr val="dk1"/>
+                </a:effectRef>
+                <a:fontRef idx="minor">
+                  <a:schemeClr val="tx1"/>
+                </a:fontRef>
+              </p:style>
+            </p:cxnSp>
+            <mc:AlternateContent xmlns:mc="http://schemas.openxmlformats.org/markup-compatibility/2006">
+              <mc:Choice xmlns:a14="http://schemas.microsoft.com/office/drawing/2010/main" Requires="a14">
+                <p:sp>
+                  <p:nvSpPr>
+                    <p:cNvPr id="29" name="Text Box 2">
+                      <a:extLst>
+                        <a:ext uri="{FF2B5EF4-FFF2-40B4-BE49-F238E27FC236}">
+                          <a16:creationId xmlns:a16="http://schemas.microsoft.com/office/drawing/2014/main" id="{65ABC8B2-F44D-426A-8519-333F66BF0D8C}"/>
+                        </a:ext>
+                      </a:extLst>
+                    </p:cNvPr>
+                    <p:cNvSpPr txBox="1">
+                      <a:spLocks noChangeArrowheads="1"/>
+                    </p:cNvSpPr>
+                    <p:nvPr/>
+                  </p:nvSpPr>
+                  <p:spPr bwMode="auto">
+                    <a:xfrm>
+                      <a:off x="3429000" y="2070100"/>
+                      <a:ext cx="328930" cy="336550"/>
+                    </a:xfrm>
+                    <a:prstGeom prst="rect">
+                      <a:avLst/>
+                    </a:prstGeom>
+                    <a:noFill/>
+                    <a:ln w="9525">
+                      <a:noFill/>
+                      <a:miter lim="800000"/>
+                      <a:headEnd/>
+                      <a:tailEnd/>
+                    </a:ln>
+                  </p:spPr>
+                  <p:txBody>
+                    <a:bodyPr rot="0" vert="horz" wrap="square" lIns="91440" tIns="45720" rIns="91440" bIns="45720" anchor="t" anchorCtr="0">
+                      <a:noAutofit/>
+                    </a:bodyPr>
+                    <a:lstStyle/>
+                    <a:p>
+                      <a:pPr marL="0" marR="0">
+                        <a:lnSpc>
+                          <a:spcPct val="107000"/>
+                        </a:lnSpc>
+                        <a:spcBef>
+                          <a:spcPts val="0"/>
+                        </a:spcBef>
+                        <a:spcAft>
+                          <a:spcPts val="800"/>
+                        </a:spcAft>
+                      </a:pPr>
+                      <a14:m>
+                        <m:oMathPara xmlns:m="http://schemas.openxmlformats.org/officeDocument/2006/math">
+                          <m:oMathParaPr>
+                            <m:jc m:val="centerGroup"/>
+                          </m:oMathParaPr>
+                          <m:oMath xmlns:m="http://schemas.openxmlformats.org/officeDocument/2006/math">
+                            <m:r>
+                              <a:rPr lang="en-US" sz="1100" b="1" i="1">
+                                <a:effectLst/>
+                                <a:latin typeface="Cambria Math" panose="02040503050406030204" pitchFamily="18" charset="0"/>
+                                <a:ea typeface="Times New Roman" panose="02020603050405020304" pitchFamily="18" charset="0"/>
+                                <a:cs typeface="Arial" panose="020B0604020202020204" pitchFamily="34" charset="0"/>
+                              </a:rPr>
+                              <m:t>𝒚</m:t>
+                            </m:r>
+                          </m:oMath>
+                        </m:oMathPara>
+                      </a14:m>
+                      <a:endParaRPr lang="en-US" sz="1100">
+                        <a:effectLst/>
+                        <a:latin typeface="Calibri" panose="020F0502020204030204" pitchFamily="34" charset="0"/>
+                        <a:ea typeface="Calibri" panose="020F0502020204030204" pitchFamily="34" charset="0"/>
+                        <a:cs typeface="Arial" panose="020B0604020202020204" pitchFamily="34" charset="0"/>
+                      </a:endParaRPr>
+                    </a:p>
+                  </p:txBody>
+                </p:sp>
+              </mc:Choice>
+              <mc:Fallback>
+                <p:sp>
+                  <p:nvSpPr>
+                    <p:cNvPr id="29" name="Text Box 2">
+                      <a:extLst>
+                        <a:ext uri="{FF2B5EF4-FFF2-40B4-BE49-F238E27FC236}">
+                          <a16:creationId xmlns:a16="http://schemas.microsoft.com/office/drawing/2014/main" id="{65ABC8B2-F44D-426A-8519-333F66BF0D8C}"/>
+                        </a:ext>
+                      </a:extLst>
+                    </p:cNvPr>
+                    <p:cNvSpPr txBox="1">
+                      <a:spLocks noRot="1" noChangeAspect="1" noMove="1" noResize="1" noEditPoints="1" noAdjustHandles="1" noChangeArrowheads="1" noChangeShapeType="1" noTextEdit="1"/>
+                    </p:cNvSpPr>
+                    <p:nvPr/>
+                  </p:nvSpPr>
+                  <p:spPr bwMode="auto">
+                    <a:xfrm>
+                      <a:off x="3429000" y="2070100"/>
+                      <a:ext cx="328930" cy="336550"/>
+                    </a:xfrm>
+                    <a:prstGeom prst="rect">
+                      <a:avLst/>
+                    </a:prstGeom>
+                    <a:blipFill>
+                      <a:blip r:embed="rId2"/>
+                      <a:stretch>
+                        <a:fillRect/>
+                      </a:stretch>
+                    </a:blipFill>
+                    <a:ln w="9525">
+                      <a:noFill/>
+                      <a:miter lim="800000"/>
+                      <a:headEnd/>
+                      <a:tailEnd/>
+                    </a:ln>
+                  </p:spPr>
+                  <p:txBody>
+                    <a:bodyPr/>
+                    <a:lstStyle/>
+                    <a:p>
+                      <a:r>
+                        <a:rPr lang="en-US">
+                          <a:noFill/>
+                        </a:rPr>
+                        <a:t> </a:t>
+                      </a:r>
+                    </a:p>
+                  </p:txBody>
+                </p:sp>
+              </mc:Fallback>
+            </mc:AlternateContent>
+            <mc:AlternateContent xmlns:mc="http://schemas.openxmlformats.org/markup-compatibility/2006">
+              <mc:Choice xmlns:a14="http://schemas.microsoft.com/office/drawing/2010/main" Requires="a14">
+                <p:sp>
+                  <p:nvSpPr>
+                    <p:cNvPr id="30" name="Text Box 2">
+                      <a:extLst>
+                        <a:ext uri="{FF2B5EF4-FFF2-40B4-BE49-F238E27FC236}">
+                          <a16:creationId xmlns:a16="http://schemas.microsoft.com/office/drawing/2014/main" id="{E0F5A281-0855-48A9-8B3E-8E2719183F8F}"/>
+                        </a:ext>
+                      </a:extLst>
+                    </p:cNvPr>
+                    <p:cNvSpPr txBox="1">
+                      <a:spLocks noChangeArrowheads="1"/>
+                    </p:cNvSpPr>
+                    <p:nvPr/>
+                  </p:nvSpPr>
+                  <p:spPr bwMode="auto">
+                    <a:xfrm>
+                      <a:off x="1930400" y="0"/>
+                      <a:ext cx="328930" cy="336550"/>
+                    </a:xfrm>
+                    <a:prstGeom prst="rect">
+                      <a:avLst/>
+                    </a:prstGeom>
+                    <a:noFill/>
+                    <a:ln w="9525">
+                      <a:noFill/>
+                      <a:miter lim="800000"/>
+                      <a:headEnd/>
+                      <a:tailEnd/>
+                    </a:ln>
+                  </p:spPr>
+                  <p:txBody>
+                    <a:bodyPr rot="0" vert="horz" wrap="square" lIns="91440" tIns="45720" rIns="91440" bIns="45720" anchor="t" anchorCtr="0">
+                      <a:noAutofit/>
+                    </a:bodyPr>
+                    <a:lstStyle/>
+                    <a:p>
+                      <a:pPr marL="0" marR="0">
+                        <a:lnSpc>
+                          <a:spcPct val="107000"/>
+                        </a:lnSpc>
+                        <a:spcBef>
+                          <a:spcPts val="0"/>
+                        </a:spcBef>
+                        <a:spcAft>
+                          <a:spcPts val="800"/>
+                        </a:spcAft>
+                      </a:pPr>
+                      <a14:m>
+                        <m:oMathPara xmlns:m="http://schemas.openxmlformats.org/officeDocument/2006/math">
+                          <m:oMathParaPr>
+                            <m:jc m:val="centerGroup"/>
+                          </m:oMathParaPr>
+                          <m:oMath xmlns:m="http://schemas.openxmlformats.org/officeDocument/2006/math">
+                            <m:r>
+                              <a:rPr lang="en-US" sz="1100" b="1" i="1">
+                                <a:effectLst/>
+                                <a:latin typeface="Cambria Math" panose="02040503050406030204" pitchFamily="18" charset="0"/>
+                                <a:ea typeface="Times New Roman" panose="02020603050405020304" pitchFamily="18" charset="0"/>
+                                <a:cs typeface="Arial" panose="020B0604020202020204" pitchFamily="34" charset="0"/>
+                              </a:rPr>
+                              <m:t>𝒛</m:t>
+                            </m:r>
+                          </m:oMath>
+                        </m:oMathPara>
+                      </a14:m>
+                      <a:endParaRPr lang="en-US" sz="1100">
+                        <a:effectLst/>
+                        <a:latin typeface="Calibri" panose="020F0502020204030204" pitchFamily="34" charset="0"/>
+                        <a:ea typeface="Calibri" panose="020F0502020204030204" pitchFamily="34" charset="0"/>
+                        <a:cs typeface="Arial" panose="020B0604020202020204" pitchFamily="34" charset="0"/>
+                      </a:endParaRPr>
+                    </a:p>
+                  </p:txBody>
+                </p:sp>
+              </mc:Choice>
+              <mc:Fallback>
+                <p:sp>
+                  <p:nvSpPr>
+                    <p:cNvPr id="30" name="Text Box 2">
+                      <a:extLst>
+                        <a:ext uri="{FF2B5EF4-FFF2-40B4-BE49-F238E27FC236}">
+                          <a16:creationId xmlns:a16="http://schemas.microsoft.com/office/drawing/2014/main" id="{E0F5A281-0855-48A9-8B3E-8E2719183F8F}"/>
+                        </a:ext>
+                      </a:extLst>
+                    </p:cNvPr>
+                    <p:cNvSpPr txBox="1">
+                      <a:spLocks noRot="1" noChangeAspect="1" noMove="1" noResize="1" noEditPoints="1" noAdjustHandles="1" noChangeArrowheads="1" noChangeShapeType="1" noTextEdit="1"/>
+                    </p:cNvSpPr>
+                    <p:nvPr/>
+                  </p:nvSpPr>
+                  <p:spPr bwMode="auto">
+                    <a:xfrm>
+                      <a:off x="1930400" y="0"/>
+                      <a:ext cx="328930" cy="336550"/>
+                    </a:xfrm>
+                    <a:prstGeom prst="rect">
+                      <a:avLst/>
+                    </a:prstGeom>
+                    <a:blipFill>
+                      <a:blip r:embed="rId3"/>
+                      <a:stretch>
+                        <a:fillRect/>
+                      </a:stretch>
+                    </a:blipFill>
+                    <a:ln w="9525">
+                      <a:noFill/>
+                      <a:miter lim="800000"/>
+                      <a:headEnd/>
+                      <a:tailEnd/>
+                    </a:ln>
+                  </p:spPr>
+                  <p:txBody>
+                    <a:bodyPr/>
+                    <a:lstStyle/>
+                    <a:p>
+                      <a:r>
+                        <a:rPr lang="en-US">
+                          <a:noFill/>
+                        </a:rPr>
+                        <a:t> </a:t>
+                      </a:r>
+                    </a:p>
+                  </p:txBody>
+                </p:sp>
+              </mc:Fallback>
+            </mc:AlternateContent>
+          </p:grpSp>
+          <p:grpSp>
+            <p:nvGrpSpPr>
+              <p:cNvPr id="8" name="Group 7">
+                <a:extLst>
+                  <a:ext uri="{FF2B5EF4-FFF2-40B4-BE49-F238E27FC236}">
+                    <a16:creationId xmlns:a16="http://schemas.microsoft.com/office/drawing/2014/main" id="{8A5BC336-A451-48E3-8317-2D470FFA1644}"/>
+                  </a:ext>
+                </a:extLst>
+              </p:cNvPr>
+              <p:cNvGrpSpPr/>
+              <p:nvPr/>
+            </p:nvGrpSpPr>
+            <p:grpSpPr>
+              <a:xfrm>
+                <a:off x="1854200" y="990600"/>
+                <a:ext cx="1162050" cy="1437005"/>
+                <a:chOff x="0" y="-31750"/>
+                <a:chExt cx="1162050" cy="1437005"/>
+              </a:xfrm>
+            </p:grpSpPr>
+            <p:sp>
+              <p:nvSpPr>
+                <p:cNvPr id="9" name="Oval 8">
+                  <a:extLst>
+                    <a:ext uri="{FF2B5EF4-FFF2-40B4-BE49-F238E27FC236}">
+                      <a16:creationId xmlns:a16="http://schemas.microsoft.com/office/drawing/2014/main" id="{1615DA34-DE95-49CB-821B-6DBE4D1DCC7A}"/>
+                    </a:ext>
+                  </a:extLst>
+                </p:cNvPr>
+                <p:cNvSpPr/>
+                <p:nvPr/>
+              </p:nvSpPr>
+              <p:spPr>
+                <a:xfrm>
+                  <a:off x="0" y="292100"/>
+                  <a:ext cx="133350" cy="133350"/>
+                </a:xfrm>
+                <a:prstGeom prst="ellipse">
+                  <a:avLst/>
+                </a:prstGeom>
+                <a:solidFill>
+                  <a:srgbClr val="00B050"/>
+                </a:solidFill>
+              </p:spPr>
+              <p:style>
+                <a:lnRef idx="2">
+                  <a:schemeClr val="accent1">
+                    <a:shade val="50000"/>
+                  </a:schemeClr>
+                </a:lnRef>
+                <a:fillRef idx="1">
+                  <a:schemeClr val="accent1"/>
+                </a:fillRef>
+                <a:effectRef idx="0">
+                  <a:schemeClr val="accent1"/>
+                </a:effectRef>
+                <a:fontRef idx="minor">
+                  <a:schemeClr val="lt1"/>
+                </a:fontRef>
+              </p:style>
+              <p:txBody>
+                <a:bodyPr rot="0" spcFirstLastPara="0" vert="horz" wrap="square" lIns="91440" tIns="45720" rIns="91440" bIns="45720" numCol="1" spcCol="0" rtlCol="0" fromWordArt="0" anchor="ctr" anchorCtr="0" forceAA="0" compatLnSpc="1">
+                  <a:prstTxWarp prst="textNoShape">
+                    <a:avLst/>
+                  </a:prstTxWarp>
+                  <a:noAutofit/>
+                </a:bodyPr>
+                <a:lstStyle/>
+                <a:p>
+                  <a:endParaRPr lang="en-US"/>
+                </a:p>
+              </p:txBody>
+            </p:sp>
+            <p:sp>
+              <p:nvSpPr>
+                <p:cNvPr id="10" name="Oval 9">
+                  <a:extLst>
+                    <a:ext uri="{FF2B5EF4-FFF2-40B4-BE49-F238E27FC236}">
+                      <a16:creationId xmlns:a16="http://schemas.microsoft.com/office/drawing/2014/main" id="{9EEC64D0-63B3-4596-89AC-D2356DCCB273}"/>
+                    </a:ext>
+                  </a:extLst>
+                </p:cNvPr>
+                <p:cNvSpPr/>
+                <p:nvPr/>
+              </p:nvSpPr>
+              <p:spPr>
+                <a:xfrm>
+                  <a:off x="1028700" y="-31750"/>
+                  <a:ext cx="133350" cy="133350"/>
+                </a:xfrm>
+                <a:prstGeom prst="ellipse">
+                  <a:avLst/>
+                </a:prstGeom>
+                <a:solidFill>
+                  <a:srgbClr val="FFC000"/>
+                </a:solidFill>
+              </p:spPr>
+              <p:style>
+                <a:lnRef idx="2">
+                  <a:schemeClr val="accent1">
+                    <a:shade val="50000"/>
+                  </a:schemeClr>
+                </a:lnRef>
+                <a:fillRef idx="1">
+                  <a:schemeClr val="accent1"/>
+                </a:fillRef>
+                <a:effectRef idx="0">
+                  <a:schemeClr val="accent1"/>
+                </a:effectRef>
+                <a:fontRef idx="minor">
+                  <a:schemeClr val="lt1"/>
+                </a:fontRef>
+              </p:style>
+              <p:txBody>
+                <a:bodyPr rot="0" spcFirstLastPara="0" vert="horz" wrap="square" lIns="91440" tIns="45720" rIns="91440" bIns="45720" numCol="1" spcCol="0" rtlCol="0" fromWordArt="0" anchor="ctr" anchorCtr="0" forceAA="0" compatLnSpc="1">
+                  <a:prstTxWarp prst="textNoShape">
+                    <a:avLst/>
+                  </a:prstTxWarp>
+                  <a:noAutofit/>
+                </a:bodyPr>
+                <a:lstStyle/>
+                <a:p>
+                  <a:endParaRPr lang="en-US"/>
+                </a:p>
+              </p:txBody>
+            </p:sp>
+            <p:cxnSp>
+              <p:nvCxnSpPr>
+                <p:cNvPr id="11" name="Straight Arrow Connector 10">
+                  <a:extLst>
+                    <a:ext uri="{FF2B5EF4-FFF2-40B4-BE49-F238E27FC236}">
+                      <a16:creationId xmlns:a16="http://schemas.microsoft.com/office/drawing/2014/main" id="{1E3C288D-C4C5-4CCF-9F6A-B00FE922A484}"/>
+                    </a:ext>
+                  </a:extLst>
+                </p:cNvPr>
+                <p:cNvCxnSpPr/>
+                <p:nvPr/>
+              </p:nvCxnSpPr>
+              <p:spPr>
+                <a:xfrm rot="16200000" flipV="1">
+                  <a:off x="-285750" y="1016000"/>
+                  <a:ext cx="763905" cy="14605"/>
+                </a:xfrm>
+                <a:prstGeom prst="straightConnector1">
+                  <a:avLst/>
+                </a:prstGeom>
+                <a:ln w="19050">
+                  <a:prstDash val="sysDot"/>
+                  <a:headEnd type="none" w="med" len="med"/>
+                  <a:tailEnd type="none" w="med" len="med"/>
+                </a:ln>
+              </p:spPr>
+              <p:style>
+                <a:lnRef idx="1">
+                  <a:schemeClr val="dk1"/>
+                </a:lnRef>
+                <a:fillRef idx="0">
+                  <a:schemeClr val="dk1"/>
+                </a:fillRef>
+                <a:effectRef idx="0">
+                  <a:schemeClr val="dk1"/>
+                </a:effectRef>
+                <a:fontRef idx="minor">
+                  <a:schemeClr val="tx1"/>
+                </a:fontRef>
+              </p:style>
+            </p:cxnSp>
+          </p:grpSp>
+        </p:grpSp>
+        <mc:AlternateContent xmlns:mc="http://schemas.openxmlformats.org/markup-compatibility/2006">
+          <mc:Choice xmlns:a14="http://schemas.microsoft.com/office/drawing/2010/main" Requires="a14">
+            <p:sp>
+              <p:nvSpPr>
+                <p:cNvPr id="6" name="Text Box 2">
+                  <a:extLst>
+                    <a:ext uri="{FF2B5EF4-FFF2-40B4-BE49-F238E27FC236}">
+                      <a16:creationId xmlns:a16="http://schemas.microsoft.com/office/drawing/2014/main" id="{3B78E91A-568D-4417-88A3-B666A28F7BC6}"/>
+                    </a:ext>
+                  </a:extLst>
+                </p:cNvPr>
+                <p:cNvSpPr txBox="1">
+                  <a:spLocks noChangeArrowheads="1"/>
+                </p:cNvSpPr>
+                <p:nvPr/>
+              </p:nvSpPr>
+              <p:spPr bwMode="auto">
+                <a:xfrm>
+                  <a:off x="215900" y="2228850"/>
+                  <a:ext cx="328930" cy="336550"/>
+                </a:xfrm>
+                <a:prstGeom prst="rect">
+                  <a:avLst/>
+                </a:prstGeom>
+                <a:noFill/>
+                <a:ln w="9525">
+                  <a:noFill/>
+                  <a:miter lim="800000"/>
+                  <a:headEnd/>
+                  <a:tailEnd/>
+                </a:ln>
+              </p:spPr>
+              <p:txBody>
+                <a:bodyPr rot="0" vert="horz" wrap="square" lIns="91440" tIns="45720" rIns="91440" bIns="45720" anchor="t" anchorCtr="0">
+                  <a:noAutofit/>
+                </a:bodyPr>
+                <a:lstStyle/>
+                <a:p>
+                  <a:pPr marL="0" marR="0">
+                    <a:lnSpc>
+                      <a:spcPct val="107000"/>
+                    </a:lnSpc>
+                    <a:spcBef>
+                      <a:spcPts val="0"/>
+                    </a:spcBef>
+                    <a:spcAft>
+                      <a:spcPts val="800"/>
+                    </a:spcAft>
+                  </a:pPr>
+                  <a14:m>
+                    <m:oMathPara xmlns:m="http://schemas.openxmlformats.org/officeDocument/2006/math">
+                      <m:oMathParaPr>
+                        <m:jc m:val="centerGroup"/>
+                      </m:oMathParaPr>
+                      <m:oMath xmlns:m="http://schemas.openxmlformats.org/officeDocument/2006/math">
+                        <m:r>
+                          <a:rPr lang="en-US" sz="1100" b="1" i="1">
+                            <a:effectLst/>
+                            <a:latin typeface="Cambria Math" panose="02040503050406030204" pitchFamily="18" charset="0"/>
+                            <a:ea typeface="Calibri" panose="020F0502020204030204" pitchFamily="34" charset="0"/>
+                            <a:cs typeface="Arial" panose="020B0604020202020204" pitchFamily="34" charset="0"/>
+                          </a:rPr>
+                          <m:t>𝒙</m:t>
+                        </m:r>
+                      </m:oMath>
+                    </m:oMathPara>
+                  </a14:m>
+                  <a:endParaRPr lang="en-US" sz="1100">
+                    <a:effectLst/>
+                    <a:latin typeface="Calibri" panose="020F0502020204030204" pitchFamily="34" charset="0"/>
+                    <a:ea typeface="Calibri" panose="020F0502020204030204" pitchFamily="34" charset="0"/>
+                    <a:cs typeface="Arial" panose="020B0604020202020204" pitchFamily="34" charset="0"/>
+                  </a:endParaRPr>
+                </a:p>
+              </p:txBody>
+            </p:sp>
+          </mc:Choice>
+          <mc:Fallback>
+            <p:sp>
+              <p:nvSpPr>
+                <p:cNvPr id="6" name="Text Box 2">
+                  <a:extLst>
+                    <a:ext uri="{FF2B5EF4-FFF2-40B4-BE49-F238E27FC236}">
+                      <a16:creationId xmlns:a16="http://schemas.microsoft.com/office/drawing/2014/main" id="{3B78E91A-568D-4417-88A3-B666A28F7BC6}"/>
+                    </a:ext>
+                  </a:extLst>
+                </p:cNvPr>
+                <p:cNvSpPr txBox="1">
+                  <a:spLocks noRot="1" noChangeAspect="1" noMove="1" noResize="1" noEditPoints="1" noAdjustHandles="1" noChangeArrowheads="1" noChangeShapeType="1" noTextEdit="1"/>
+                </p:cNvSpPr>
+                <p:nvPr/>
+              </p:nvSpPr>
+              <p:spPr bwMode="auto">
+                <a:xfrm>
+                  <a:off x="215900" y="2228850"/>
+                  <a:ext cx="328930" cy="336550"/>
+                </a:xfrm>
+                <a:prstGeom prst="rect">
+                  <a:avLst/>
+                </a:prstGeom>
+                <a:blipFill>
+                  <a:blip r:embed="rId4"/>
+                  <a:stretch>
+                    <a:fillRect/>
+                  </a:stretch>
+                </a:blipFill>
+                <a:ln w="9525">
+                  <a:noFill/>
+                  <a:miter lim="800000"/>
+                  <a:headEnd/>
+                  <a:tailEnd/>
+                </a:ln>
+              </p:spPr>
+              <p:txBody>
+                <a:bodyPr/>
+                <a:lstStyle/>
+                <a:p>
+                  <a:r>
+                    <a:rPr lang="en-US">
+                      <a:noFill/>
+                    </a:rPr>
+                    <a:t> </a:t>
+                  </a:r>
+                </a:p>
+              </p:txBody>
+            </p:sp>
+          </mc:Fallback>
+        </mc:AlternateContent>
+      </p:grpSp>
+    </p:spTree>
+    <p:extLst>
+      <p:ext uri="{BB962C8B-B14F-4D97-AF65-F5344CB8AC3E}">
+        <p14:creationId xmlns:p14="http://schemas.microsoft.com/office/powerpoint/2010/main" val="3828658567"/>
+      </p:ext>
+    </p:extLst>
+  </p:cSld>
+  <p:clrMapOvr>
+    <a:masterClrMapping/>
+  </p:clrMapOvr>
+</p:sld>
+</file>
+
+<file path=ppt/slides/slide4.xml><?xml version="1.0" encoding="utf-8"?>
+<p:sld xmlns:a="http://schemas.openxmlformats.org/drawingml/2006/main" xmlns:r="http://schemas.openxmlformats.org/officeDocument/2006/relationships" xmlns:p="http://schemas.openxmlformats.org/presentationml/2006/main">
+  <p:cSld>
+    <p:spTree>
+      <p:nvGrpSpPr>
+        <p:cNvPr id="1" name=""/>
+        <p:cNvGrpSpPr/>
+        <p:nvPr/>
+      </p:nvGrpSpPr>
+      <p:grpSpPr>
+        <a:xfrm>
+          <a:off x="0" y="0"/>
+          <a:ext cx="0" cy="0"/>
+          <a:chOff x="0" y="0"/>
+          <a:chExt cx="0" cy="0"/>
+        </a:xfrm>
+      </p:grpSpPr>
+      <p:grpSp>
+        <p:nvGrpSpPr>
+          <p:cNvPr id="4" name="Group 3">
+            <a:extLst>
+              <a:ext uri="{FF2B5EF4-FFF2-40B4-BE49-F238E27FC236}">
+                <a16:creationId xmlns:a16="http://schemas.microsoft.com/office/drawing/2014/main" id="{E512224F-0509-47F7-904A-5D8D5E7EF544}"/>
+              </a:ext>
+            </a:extLst>
+          </p:cNvPr>
+          <p:cNvGrpSpPr/>
+          <p:nvPr/>
+        </p:nvGrpSpPr>
+        <p:grpSpPr>
+          <a:xfrm>
+            <a:off x="3790950" y="2047875"/>
+            <a:ext cx="4610100" cy="2762250"/>
+            <a:chOff x="0" y="0"/>
+            <a:chExt cx="4610100" cy="2762250"/>
+          </a:xfrm>
+        </p:grpSpPr>
+        <p:grpSp>
+          <p:nvGrpSpPr>
+            <p:cNvPr id="5" name="Group 4">
+              <a:extLst>
+                <a:ext uri="{FF2B5EF4-FFF2-40B4-BE49-F238E27FC236}">
+                  <a16:creationId xmlns:a16="http://schemas.microsoft.com/office/drawing/2014/main" id="{B44BB9C3-BF9C-4E01-B3B8-409DFF0CDF68}"/>
+                </a:ext>
+              </a:extLst>
+            </p:cNvPr>
+            <p:cNvGrpSpPr/>
+            <p:nvPr/>
+          </p:nvGrpSpPr>
+          <p:grpSpPr>
+            <a:xfrm>
+              <a:off x="0" y="184150"/>
+              <a:ext cx="3853180" cy="2578100"/>
+              <a:chOff x="0" y="0"/>
+              <a:chExt cx="3853180" cy="2578100"/>
+            </a:xfrm>
+          </p:grpSpPr>
+          <p:grpSp>
+            <p:nvGrpSpPr>
+              <p:cNvPr id="9" name="Group 8">
+                <a:extLst>
+                  <a:ext uri="{FF2B5EF4-FFF2-40B4-BE49-F238E27FC236}">
+                    <a16:creationId xmlns:a16="http://schemas.microsoft.com/office/drawing/2014/main" id="{FD2425FA-9D5A-4B6D-BAC6-6B1D1A2C7101}"/>
+                  </a:ext>
+                </a:extLst>
+              </p:cNvPr>
+              <p:cNvGrpSpPr/>
+              <p:nvPr/>
+            </p:nvGrpSpPr>
+            <p:grpSpPr>
+              <a:xfrm>
+                <a:off x="0" y="0"/>
+                <a:ext cx="3853180" cy="2578100"/>
+                <a:chOff x="0" y="0"/>
+                <a:chExt cx="3853180" cy="2578100"/>
+              </a:xfrm>
+            </p:grpSpPr>
+            <p:grpSp>
+              <p:nvGrpSpPr>
+                <p:cNvPr id="11" name="Group 10">
+                  <a:extLst>
+                    <a:ext uri="{FF2B5EF4-FFF2-40B4-BE49-F238E27FC236}">
+                      <a16:creationId xmlns:a16="http://schemas.microsoft.com/office/drawing/2014/main" id="{F94377CC-9007-4AF5-BC0B-BBBBC186A0D5}"/>
+                    </a:ext>
+                  </a:extLst>
+                </p:cNvPr>
+                <p:cNvGrpSpPr/>
+                <p:nvPr/>
+              </p:nvGrpSpPr>
+              <p:grpSpPr>
+                <a:xfrm>
+                  <a:off x="0" y="0"/>
+                  <a:ext cx="3853180" cy="2578100"/>
+                  <a:chOff x="0" y="0"/>
+                  <a:chExt cx="3853180" cy="2578100"/>
+                </a:xfrm>
+              </p:grpSpPr>
+              <p:cxnSp>
+                <p:nvCxnSpPr>
+                  <p:cNvPr id="16" name="Straight Arrow Connector 15">
+                    <a:extLst>
+                      <a:ext uri="{FF2B5EF4-FFF2-40B4-BE49-F238E27FC236}">
+                        <a16:creationId xmlns:a16="http://schemas.microsoft.com/office/drawing/2014/main" id="{3D4C19AB-D4A5-4451-9288-28D533A70BCE}"/>
+                      </a:ext>
+                    </a:extLst>
+                  </p:cNvPr>
+                  <p:cNvCxnSpPr/>
+                  <p:nvPr/>
+                </p:nvCxnSpPr>
+                <p:spPr>
+                  <a:xfrm rot="16200000" flipV="1">
+                    <a:off x="1231900" y="717550"/>
+                    <a:ext cx="1370965" cy="3732"/>
+                  </a:xfrm>
+                  <a:prstGeom prst="straightConnector1">
+                    <a:avLst/>
+                  </a:prstGeom>
+                  <a:ln w="19050">
+                    <a:tailEnd type="triangle"/>
+                  </a:ln>
+                </p:spPr>
+                <p:style>
+                  <a:lnRef idx="1">
+                    <a:schemeClr val="dk1"/>
+                  </a:lnRef>
+                  <a:fillRef idx="0">
+                    <a:schemeClr val="dk1"/>
+                  </a:fillRef>
+                  <a:effectRef idx="0">
+                    <a:schemeClr val="dk1"/>
+                  </a:effectRef>
+                  <a:fontRef idx="minor">
+                    <a:schemeClr val="tx1"/>
+                  </a:fontRef>
+                </p:style>
+              </p:cxnSp>
+              <p:cxnSp>
+                <p:nvCxnSpPr>
+                  <p:cNvPr id="17" name="Straight Arrow Connector 16">
+                    <a:extLst>
+                      <a:ext uri="{FF2B5EF4-FFF2-40B4-BE49-F238E27FC236}">
+                        <a16:creationId xmlns:a16="http://schemas.microsoft.com/office/drawing/2014/main" id="{636BA40E-C158-445E-83BA-85B7467436D4}"/>
+                      </a:ext>
+                    </a:extLst>
+                  </p:cNvPr>
+                  <p:cNvCxnSpPr/>
+                  <p:nvPr/>
+                </p:nvCxnSpPr>
+                <p:spPr>
+                  <a:xfrm rot="1800000" flipV="1">
+                    <a:off x="1778000" y="1885950"/>
+                    <a:ext cx="2075180" cy="17780"/>
+                  </a:xfrm>
+                  <a:prstGeom prst="straightConnector1">
+                    <a:avLst/>
+                  </a:prstGeom>
+                  <a:ln w="19050">
+                    <a:tailEnd type="triangle"/>
+                  </a:ln>
+                </p:spPr>
+                <p:style>
+                  <a:lnRef idx="1">
+                    <a:schemeClr val="dk1"/>
+                  </a:lnRef>
+                  <a:fillRef idx="0">
+                    <a:schemeClr val="dk1"/>
+                  </a:fillRef>
+                  <a:effectRef idx="0">
+                    <a:schemeClr val="dk1"/>
+                  </a:effectRef>
+                  <a:fontRef idx="minor">
+                    <a:schemeClr val="tx1"/>
+                  </a:fontRef>
+                </p:style>
+              </p:cxnSp>
+              <p:cxnSp>
+                <p:nvCxnSpPr>
+                  <p:cNvPr id="18" name="Straight Arrow Connector 17">
+                    <a:extLst>
+                      <a:ext uri="{FF2B5EF4-FFF2-40B4-BE49-F238E27FC236}">
+                        <a16:creationId xmlns:a16="http://schemas.microsoft.com/office/drawing/2014/main" id="{1599CDDB-A0D2-4224-8F80-78B7F27D79AE}"/>
+                      </a:ext>
+                    </a:extLst>
+                  </p:cNvPr>
+                  <p:cNvCxnSpPr/>
+                  <p:nvPr/>
+                </p:nvCxnSpPr>
+                <p:spPr>
+                  <a:xfrm rot="9000000" flipV="1">
+                    <a:off x="0" y="1898650"/>
+                    <a:ext cx="2075180" cy="17780"/>
+                  </a:xfrm>
+                  <a:prstGeom prst="straightConnector1">
+                    <a:avLst/>
+                  </a:prstGeom>
+                  <a:ln w="19050">
+                    <a:tailEnd type="triangle"/>
+                  </a:ln>
+                </p:spPr>
+                <p:style>
+                  <a:lnRef idx="1">
+                    <a:schemeClr val="dk1"/>
+                  </a:lnRef>
+                  <a:fillRef idx="0">
+                    <a:schemeClr val="dk1"/>
+                  </a:fillRef>
+                  <a:effectRef idx="0">
+                    <a:schemeClr val="dk1"/>
+                  </a:effectRef>
+                  <a:fontRef idx="minor">
+                    <a:schemeClr val="tx1"/>
+                  </a:fontRef>
+                </p:style>
+              </p:cxnSp>
+              <p:sp>
+                <p:nvSpPr>
+                  <p:cNvPr id="19" name="Oval 18">
+                    <a:extLst>
+                      <a:ext uri="{FF2B5EF4-FFF2-40B4-BE49-F238E27FC236}">
+                        <a16:creationId xmlns:a16="http://schemas.microsoft.com/office/drawing/2014/main" id="{37D2446B-6527-49A0-B8B9-EC8B204992F2}"/>
+                      </a:ext>
+                    </a:extLst>
+                  </p:cNvPr>
+                  <p:cNvSpPr/>
+                  <p:nvPr/>
+                </p:nvSpPr>
+                <p:spPr>
+                  <a:xfrm>
+                    <a:off x="1854200" y="412750"/>
+                    <a:ext cx="133350" cy="133350"/>
+                  </a:xfrm>
+                  <a:prstGeom prst="ellipse">
+                    <a:avLst/>
+                  </a:prstGeom>
+                  <a:solidFill>
+                    <a:srgbClr val="00B050"/>
+                  </a:solidFill>
+                </p:spPr>
+                <p:style>
+                  <a:lnRef idx="2">
+                    <a:schemeClr val="accent1">
+                      <a:shade val="50000"/>
+                    </a:schemeClr>
+                  </a:lnRef>
+                  <a:fillRef idx="1">
+                    <a:schemeClr val="accent1"/>
+                  </a:fillRef>
+                  <a:effectRef idx="0">
+                    <a:schemeClr val="accent1"/>
+                  </a:effectRef>
+                  <a:fontRef idx="minor">
+                    <a:schemeClr val="lt1"/>
+                  </a:fontRef>
+                </p:style>
+                <p:txBody>
+                  <a:bodyPr rot="0" spcFirstLastPara="0" vert="horz" wrap="square" lIns="91440" tIns="45720" rIns="91440" bIns="45720" numCol="1" spcCol="0" rtlCol="0" fromWordArt="0" anchor="ctr" anchorCtr="0" forceAA="0" compatLnSpc="1">
+                    <a:prstTxWarp prst="textNoShape">
+                      <a:avLst/>
+                    </a:prstTxWarp>
+                    <a:noAutofit/>
+                  </a:bodyPr>
+                  <a:lstStyle/>
+                  <a:p>
+                    <a:endParaRPr lang="en-US"/>
+                  </a:p>
+                </p:txBody>
+              </p:sp>
+              <p:sp>
+                <p:nvSpPr>
+                  <p:cNvPr id="20" name="Oval 19">
+                    <a:extLst>
+                      <a:ext uri="{FF2B5EF4-FFF2-40B4-BE49-F238E27FC236}">
+                        <a16:creationId xmlns:a16="http://schemas.microsoft.com/office/drawing/2014/main" id="{26E27B11-43E0-4C8F-9836-895ECE658910}"/>
+                      </a:ext>
+                    </a:extLst>
+                  </p:cNvPr>
+                  <p:cNvSpPr/>
+                  <p:nvPr/>
+                </p:nvSpPr>
+                <p:spPr>
+                  <a:xfrm>
+                    <a:off x="2921000" y="1898650"/>
+                    <a:ext cx="133350" cy="133350"/>
+                  </a:xfrm>
+                  <a:prstGeom prst="ellipse">
+                    <a:avLst/>
+                  </a:prstGeom>
+                  <a:solidFill>
+                    <a:srgbClr val="FFC000"/>
+                  </a:solidFill>
+                </p:spPr>
+                <p:style>
+                  <a:lnRef idx="2">
+                    <a:schemeClr val="accent1">
+                      <a:shade val="50000"/>
+                    </a:schemeClr>
+                  </a:lnRef>
+                  <a:fillRef idx="1">
+                    <a:schemeClr val="accent1"/>
+                  </a:fillRef>
+                  <a:effectRef idx="0">
+                    <a:schemeClr val="accent1"/>
+                  </a:effectRef>
+                  <a:fontRef idx="minor">
+                    <a:schemeClr val="lt1"/>
+                  </a:fontRef>
+                </p:style>
+                <p:txBody>
+                  <a:bodyPr rot="0" spcFirstLastPara="0" vert="horz" wrap="square" lIns="91440" tIns="45720" rIns="91440" bIns="45720" numCol="1" spcCol="0" rtlCol="0" fromWordArt="0" anchor="ctr" anchorCtr="0" forceAA="0" compatLnSpc="1">
+                    <a:prstTxWarp prst="textNoShape">
+                      <a:avLst/>
+                    </a:prstTxWarp>
+                    <a:noAutofit/>
+                  </a:bodyPr>
+                  <a:lstStyle/>
+                  <a:p>
+                    <a:endParaRPr lang="en-US"/>
+                  </a:p>
+                </p:txBody>
+              </p:sp>
+              <p:sp>
+                <p:nvSpPr>
+                  <p:cNvPr id="21" name="Oval 20">
+                    <a:extLst>
+                      <a:ext uri="{FF2B5EF4-FFF2-40B4-BE49-F238E27FC236}">
+                        <a16:creationId xmlns:a16="http://schemas.microsoft.com/office/drawing/2014/main" id="{330F10AC-03F7-4309-B0AB-43B5E7D1D8A8}"/>
+                      </a:ext>
+                    </a:extLst>
+                  </p:cNvPr>
+                  <p:cNvSpPr/>
+                  <p:nvPr/>
+                </p:nvSpPr>
+                <p:spPr>
+                  <a:xfrm>
+                    <a:off x="876300" y="996950"/>
+                    <a:ext cx="133350" cy="133350"/>
+                  </a:xfrm>
+                  <a:prstGeom prst="ellipse">
+                    <a:avLst/>
+                  </a:prstGeom>
+                  <a:solidFill>
+                    <a:srgbClr val="00B050"/>
+                  </a:solidFill>
+                </p:spPr>
+                <p:style>
+                  <a:lnRef idx="2">
+                    <a:schemeClr val="accent1">
+                      <a:shade val="50000"/>
+                    </a:schemeClr>
+                  </a:lnRef>
+                  <a:fillRef idx="1">
+                    <a:schemeClr val="accent1"/>
+                  </a:fillRef>
+                  <a:effectRef idx="0">
+                    <a:schemeClr val="accent1"/>
+                  </a:effectRef>
+                  <a:fontRef idx="minor">
+                    <a:schemeClr val="lt1"/>
+                  </a:fontRef>
+                </p:style>
+                <p:txBody>
+                  <a:bodyPr rot="0" spcFirstLastPara="0" vert="horz" wrap="square" lIns="91440" tIns="45720" rIns="91440" bIns="45720" numCol="1" spcCol="0" rtlCol="0" fromWordArt="0" anchor="ctr" anchorCtr="0" forceAA="0" compatLnSpc="1">
+                    <a:prstTxWarp prst="textNoShape">
+                      <a:avLst/>
+                    </a:prstTxWarp>
+                    <a:noAutofit/>
+                  </a:bodyPr>
+                  <a:lstStyle/>
+                  <a:p>
+                    <a:endParaRPr lang="en-US"/>
+                  </a:p>
+                </p:txBody>
+              </p:sp>
+              <p:sp>
+                <p:nvSpPr>
+                  <p:cNvPr id="22" name="Oval 21">
+                    <a:extLst>
+                      <a:ext uri="{FF2B5EF4-FFF2-40B4-BE49-F238E27FC236}">
+                        <a16:creationId xmlns:a16="http://schemas.microsoft.com/office/drawing/2014/main" id="{92F3B4F4-5CDA-4461-9C13-4EFC75C8C272}"/>
+                      </a:ext>
+                    </a:extLst>
+                  </p:cNvPr>
+                  <p:cNvSpPr/>
+                  <p:nvPr/>
+                </p:nvSpPr>
+                <p:spPr>
+                  <a:xfrm>
+                    <a:off x="876300" y="1885950"/>
+                    <a:ext cx="133350" cy="133350"/>
+                  </a:xfrm>
+                  <a:prstGeom prst="ellipse">
+                    <a:avLst/>
+                  </a:prstGeom>
+                  <a:solidFill>
+                    <a:srgbClr val="00B050"/>
+                  </a:solidFill>
+                </p:spPr>
+                <p:style>
+                  <a:lnRef idx="2">
+                    <a:schemeClr val="accent1">
+                      <a:shade val="50000"/>
+                    </a:schemeClr>
+                  </a:lnRef>
+                  <a:fillRef idx="1">
+                    <a:schemeClr val="accent1"/>
+                  </a:fillRef>
+                  <a:effectRef idx="0">
+                    <a:schemeClr val="accent1"/>
+                  </a:effectRef>
+                  <a:fontRef idx="minor">
+                    <a:schemeClr val="lt1"/>
+                  </a:fontRef>
+                </p:style>
+                <p:txBody>
+                  <a:bodyPr rot="0" spcFirstLastPara="0" vert="horz" wrap="square" lIns="91440" tIns="45720" rIns="91440" bIns="45720" numCol="1" spcCol="0" rtlCol="0" fromWordArt="0" anchor="ctr" anchorCtr="0" forceAA="0" compatLnSpc="1">
+                    <a:prstTxWarp prst="textNoShape">
+                      <a:avLst/>
+                    </a:prstTxWarp>
+                    <a:noAutofit/>
+                  </a:bodyPr>
+                  <a:lstStyle/>
+                  <a:p>
+                    <a:endParaRPr lang="en-US"/>
+                  </a:p>
+                </p:txBody>
+              </p:sp>
+              <p:sp>
+                <p:nvSpPr>
+                  <p:cNvPr id="23" name="Oval 22">
+                    <a:extLst>
+                      <a:ext uri="{FF2B5EF4-FFF2-40B4-BE49-F238E27FC236}">
+                        <a16:creationId xmlns:a16="http://schemas.microsoft.com/office/drawing/2014/main" id="{4538129B-A3E0-4677-9283-02997090EE28}"/>
+                      </a:ext>
+                    </a:extLst>
+                  </p:cNvPr>
+                  <p:cNvSpPr/>
+                  <p:nvPr/>
+                </p:nvSpPr>
+                <p:spPr>
+                  <a:xfrm>
+                    <a:off x="1898650" y="1555750"/>
+                    <a:ext cx="133350" cy="133350"/>
+                  </a:xfrm>
+                  <a:prstGeom prst="ellipse">
+                    <a:avLst/>
+                  </a:prstGeom>
+                  <a:solidFill>
+                    <a:srgbClr val="FFC000"/>
+                  </a:solidFill>
+                </p:spPr>
+                <p:style>
+                  <a:lnRef idx="2">
+                    <a:schemeClr val="accent1">
+                      <a:shade val="50000"/>
+                    </a:schemeClr>
+                  </a:lnRef>
+                  <a:fillRef idx="1">
+                    <a:schemeClr val="accent1"/>
+                  </a:fillRef>
+                  <a:effectRef idx="0">
+                    <a:schemeClr val="accent1"/>
+                  </a:effectRef>
+                  <a:fontRef idx="minor">
+                    <a:schemeClr val="lt1"/>
+                  </a:fontRef>
+                </p:style>
+                <p:txBody>
+                  <a:bodyPr rot="0" spcFirstLastPara="0" vert="horz" wrap="square" lIns="91440" tIns="45720" rIns="91440" bIns="45720" numCol="1" spcCol="0" rtlCol="0" fromWordArt="0" anchor="ctr" anchorCtr="0" forceAA="0" compatLnSpc="1">
+                    <a:prstTxWarp prst="textNoShape">
+                      <a:avLst/>
+                    </a:prstTxWarp>
+                    <a:noAutofit/>
+                  </a:bodyPr>
+                  <a:lstStyle/>
+                  <a:p>
+                    <a:endParaRPr lang="en-US"/>
+                  </a:p>
+                </p:txBody>
+              </p:sp>
+              <p:sp>
+                <p:nvSpPr>
+                  <p:cNvPr id="24" name="Oval 23">
+                    <a:extLst>
+                      <a:ext uri="{FF2B5EF4-FFF2-40B4-BE49-F238E27FC236}">
+                        <a16:creationId xmlns:a16="http://schemas.microsoft.com/office/drawing/2014/main" id="{03D0D211-464B-4EA3-B5F3-1958F65D31E7}"/>
+                      </a:ext>
+                    </a:extLst>
+                  </p:cNvPr>
+                  <p:cNvSpPr/>
+                  <p:nvPr/>
+                </p:nvSpPr>
+                <p:spPr>
+                  <a:xfrm>
+                    <a:off x="1905000" y="2444750"/>
+                    <a:ext cx="133350" cy="133350"/>
+                  </a:xfrm>
+                  <a:prstGeom prst="ellipse">
+                    <a:avLst/>
+                  </a:prstGeom>
+                  <a:solidFill>
+                    <a:srgbClr val="FFC000"/>
+                  </a:solidFill>
+                </p:spPr>
+                <p:style>
+                  <a:lnRef idx="2">
+                    <a:schemeClr val="accent1">
+                      <a:shade val="50000"/>
+                    </a:schemeClr>
+                  </a:lnRef>
+                  <a:fillRef idx="1">
+                    <a:schemeClr val="accent1"/>
+                  </a:fillRef>
+                  <a:effectRef idx="0">
+                    <a:schemeClr val="accent1"/>
+                  </a:effectRef>
+                  <a:fontRef idx="minor">
+                    <a:schemeClr val="lt1"/>
+                  </a:fontRef>
+                </p:style>
+                <p:txBody>
+                  <a:bodyPr rot="0" spcFirstLastPara="0" vert="horz" wrap="square" lIns="91440" tIns="45720" rIns="91440" bIns="45720" numCol="1" spcCol="0" rtlCol="0" fromWordArt="0" anchor="ctr" anchorCtr="0" forceAA="0" compatLnSpc="1">
+                    <a:prstTxWarp prst="textNoShape">
+                      <a:avLst/>
+                    </a:prstTxWarp>
+                    <a:noAutofit/>
+                  </a:bodyPr>
+                  <a:lstStyle/>
+                  <a:p>
+                    <a:endParaRPr lang="en-US"/>
+                  </a:p>
+                </p:txBody>
+              </p:sp>
+              <p:cxnSp>
+                <p:nvCxnSpPr>
+                  <p:cNvPr id="25" name="Straight Arrow Connector 24">
+                    <a:extLst>
+                      <a:ext uri="{FF2B5EF4-FFF2-40B4-BE49-F238E27FC236}">
+                        <a16:creationId xmlns:a16="http://schemas.microsoft.com/office/drawing/2014/main" id="{0FB190AA-9C04-4B3F-9709-70CFA6BCFF2B}"/>
+                      </a:ext>
+                    </a:extLst>
+                  </p:cNvPr>
+                  <p:cNvCxnSpPr/>
+                  <p:nvPr/>
+                </p:nvCxnSpPr>
+                <p:spPr>
+                  <a:xfrm rot="1800000" flipV="1">
+                    <a:off x="1924050" y="717550"/>
+                    <a:ext cx="1083945" cy="45085"/>
+                  </a:xfrm>
+                  <a:prstGeom prst="straightConnector1">
+                    <a:avLst/>
+                  </a:prstGeom>
+                  <a:ln w="19050">
+                    <a:prstDash val="sysDot"/>
+                    <a:headEnd type="none" w="med" len="med"/>
+                    <a:tailEnd type="none" w="med" len="med"/>
+                  </a:ln>
+                </p:spPr>
+                <p:style>
+                  <a:lnRef idx="1">
+                    <a:schemeClr val="dk1"/>
+                  </a:lnRef>
+                  <a:fillRef idx="0">
+                    <a:schemeClr val="dk1"/>
+                  </a:fillRef>
+                  <a:effectRef idx="0">
+                    <a:schemeClr val="dk1"/>
+                  </a:effectRef>
+                  <a:fontRef idx="minor">
+                    <a:schemeClr val="tx1"/>
+                  </a:fontRef>
+                </p:style>
+              </p:cxnSp>
+              <p:cxnSp>
+                <p:nvCxnSpPr>
+                  <p:cNvPr id="26" name="Straight Arrow Connector 25">
+                    <a:extLst>
+                      <a:ext uri="{FF2B5EF4-FFF2-40B4-BE49-F238E27FC236}">
+                        <a16:creationId xmlns:a16="http://schemas.microsoft.com/office/drawing/2014/main" id="{0CC5045C-CA7E-49B6-B6FF-F673076BA70D}"/>
+                      </a:ext>
+                    </a:extLst>
+                  </p:cNvPr>
+                  <p:cNvCxnSpPr/>
+                  <p:nvPr/>
+                </p:nvCxnSpPr>
+                <p:spPr>
+                  <a:xfrm rot="1800000" flipV="1">
+                    <a:off x="914400" y="1327150"/>
+                    <a:ext cx="1083945" cy="45085"/>
+                  </a:xfrm>
+                  <a:prstGeom prst="straightConnector1">
+                    <a:avLst/>
+                  </a:prstGeom>
+                  <a:ln w="19050">
+                    <a:prstDash val="sysDot"/>
+                    <a:headEnd type="none" w="med" len="med"/>
+                    <a:tailEnd type="none" w="med" len="med"/>
+                  </a:ln>
+                </p:spPr>
+                <p:style>
+                  <a:lnRef idx="1">
+                    <a:schemeClr val="dk1"/>
+                  </a:lnRef>
+                  <a:fillRef idx="0">
+                    <a:schemeClr val="dk1"/>
+                  </a:fillRef>
+                  <a:effectRef idx="0">
+                    <a:schemeClr val="dk1"/>
+                  </a:effectRef>
+                  <a:fontRef idx="minor">
+                    <a:schemeClr val="tx1"/>
+                  </a:fontRef>
+                </p:style>
+              </p:cxnSp>
+              <p:cxnSp>
+                <p:nvCxnSpPr>
+                  <p:cNvPr id="27" name="Straight Arrow Connector 26">
+                    <a:extLst>
+                      <a:ext uri="{FF2B5EF4-FFF2-40B4-BE49-F238E27FC236}">
+                        <a16:creationId xmlns:a16="http://schemas.microsoft.com/office/drawing/2014/main" id="{7EA4F748-2CD2-4887-8FDE-782D01F1FB21}"/>
+                      </a:ext>
+                    </a:extLst>
+                  </p:cNvPr>
+                  <p:cNvCxnSpPr/>
+                  <p:nvPr/>
+                </p:nvCxnSpPr>
+                <p:spPr>
+                  <a:xfrm rot="16200000" flipV="1">
+                    <a:off x="552450" y="1466850"/>
+                    <a:ext cx="763905" cy="14605"/>
+                  </a:xfrm>
+                  <a:prstGeom prst="straightConnector1">
+                    <a:avLst/>
+                  </a:prstGeom>
+                  <a:ln w="19050">
+                    <a:prstDash val="sysDot"/>
+                    <a:headEnd type="none" w="med" len="med"/>
+                    <a:tailEnd type="none" w="med" len="med"/>
+                  </a:ln>
+                </p:spPr>
+                <p:style>
+                  <a:lnRef idx="1">
+                    <a:schemeClr val="dk1"/>
+                  </a:lnRef>
+                  <a:fillRef idx="0">
+                    <a:schemeClr val="dk1"/>
+                  </a:fillRef>
+                  <a:effectRef idx="0">
+                    <a:schemeClr val="dk1"/>
+                  </a:effectRef>
+                  <a:fontRef idx="minor">
+                    <a:schemeClr val="tx1"/>
+                  </a:fontRef>
+                </p:style>
+              </p:cxnSp>
+              <p:cxnSp>
+                <p:nvCxnSpPr>
+                  <p:cNvPr id="28" name="Straight Arrow Connector 27">
+                    <a:extLst>
+                      <a:ext uri="{FF2B5EF4-FFF2-40B4-BE49-F238E27FC236}">
+                        <a16:creationId xmlns:a16="http://schemas.microsoft.com/office/drawing/2014/main" id="{AA7BFB48-94AE-4908-B967-3035A6696677}"/>
+                      </a:ext>
+                    </a:extLst>
+                  </p:cNvPr>
+                  <p:cNvCxnSpPr/>
+                  <p:nvPr/>
+                </p:nvCxnSpPr>
+                <p:spPr>
+                  <a:xfrm rot="16200000" flipV="1">
+                    <a:off x="2603500" y="1511300"/>
+                    <a:ext cx="763905" cy="14605"/>
+                  </a:xfrm>
+                  <a:prstGeom prst="straightConnector1">
+                    <a:avLst/>
+                  </a:prstGeom>
+                  <a:ln w="19050">
+                    <a:prstDash val="sysDot"/>
+                    <a:headEnd type="none" w="med" len="med"/>
+                    <a:tailEnd type="none" w="med" len="med"/>
+                  </a:ln>
+                </p:spPr>
+                <p:style>
+                  <a:lnRef idx="1">
+                    <a:schemeClr val="dk1"/>
+                  </a:lnRef>
+                  <a:fillRef idx="0">
+                    <a:schemeClr val="dk1"/>
+                  </a:fillRef>
+                  <a:effectRef idx="0">
+                    <a:schemeClr val="dk1"/>
+                  </a:effectRef>
+                  <a:fontRef idx="minor">
+                    <a:schemeClr val="tx1"/>
+                  </a:fontRef>
+                </p:style>
+              </p:cxnSp>
+              <p:cxnSp>
+                <p:nvCxnSpPr>
+                  <p:cNvPr id="29" name="Straight Arrow Connector 28">
+                    <a:extLst>
+                      <a:ext uri="{FF2B5EF4-FFF2-40B4-BE49-F238E27FC236}">
+                        <a16:creationId xmlns:a16="http://schemas.microsoft.com/office/drawing/2014/main" id="{91D292CE-6A06-4B44-BA1F-C6A53D3D7E21}"/>
+                      </a:ext>
+                    </a:extLst>
+                  </p:cNvPr>
+                  <p:cNvCxnSpPr/>
+                  <p:nvPr/>
+                </p:nvCxnSpPr>
+                <p:spPr>
+                  <a:xfrm rot="1800000" flipV="1">
+                    <a:off x="908050" y="2216150"/>
+                    <a:ext cx="1083945" cy="45085"/>
+                  </a:xfrm>
+                  <a:prstGeom prst="straightConnector1">
+                    <a:avLst/>
+                  </a:prstGeom>
+                  <a:ln w="19050">
+                    <a:prstDash val="sysDot"/>
+                    <a:headEnd type="none" w="med" len="med"/>
+                    <a:tailEnd type="none" w="med" len="med"/>
+                  </a:ln>
+                </p:spPr>
+                <p:style>
+                  <a:lnRef idx="1">
+                    <a:schemeClr val="dk1"/>
+                  </a:lnRef>
+                  <a:fillRef idx="0">
+                    <a:schemeClr val="dk1"/>
+                  </a:fillRef>
+                  <a:effectRef idx="0">
+                    <a:schemeClr val="dk1"/>
+                  </a:effectRef>
+                  <a:fontRef idx="minor">
+                    <a:schemeClr val="tx1"/>
+                  </a:fontRef>
+                </p:style>
+              </p:cxnSp>
+              <p:cxnSp>
+                <p:nvCxnSpPr>
+                  <p:cNvPr id="30" name="Straight Arrow Connector 29">
+                    <a:extLst>
+                      <a:ext uri="{FF2B5EF4-FFF2-40B4-BE49-F238E27FC236}">
+                        <a16:creationId xmlns:a16="http://schemas.microsoft.com/office/drawing/2014/main" id="{BF6EB98B-C18F-4B21-8D6A-FEE5E2944707}"/>
+                      </a:ext>
+                    </a:extLst>
+                  </p:cNvPr>
+                  <p:cNvCxnSpPr/>
+                  <p:nvPr/>
+                </p:nvCxnSpPr>
+                <p:spPr>
+                  <a:xfrm rot="19800000">
+                    <a:off x="1962150" y="2209800"/>
+                    <a:ext cx="1084476" cy="45719"/>
+                  </a:xfrm>
+                  <a:prstGeom prst="straightConnector1">
+                    <a:avLst/>
+                  </a:prstGeom>
+                  <a:ln w="19050">
+                    <a:prstDash val="sysDot"/>
+                    <a:headEnd type="none" w="med" len="med"/>
+                    <a:tailEnd type="none" w="med" len="med"/>
+                  </a:ln>
+                </p:spPr>
+                <p:style>
+                  <a:lnRef idx="1">
+                    <a:schemeClr val="dk1"/>
+                  </a:lnRef>
+                  <a:fillRef idx="0">
+                    <a:schemeClr val="dk1"/>
+                  </a:fillRef>
+                  <a:effectRef idx="0">
+                    <a:schemeClr val="dk1"/>
+                  </a:effectRef>
+                  <a:fontRef idx="minor">
+                    <a:schemeClr val="tx1"/>
+                  </a:fontRef>
+                </p:style>
+              </p:cxnSp>
+              <p:cxnSp>
+                <p:nvCxnSpPr>
+                  <p:cNvPr id="31" name="Straight Arrow Connector 30">
+                    <a:extLst>
+                      <a:ext uri="{FF2B5EF4-FFF2-40B4-BE49-F238E27FC236}">
+                        <a16:creationId xmlns:a16="http://schemas.microsoft.com/office/drawing/2014/main" id="{570F583F-797D-4E0D-A722-EB91C4CA843B}"/>
+                      </a:ext>
+                    </a:extLst>
+                  </p:cNvPr>
+                  <p:cNvCxnSpPr/>
+                  <p:nvPr/>
+                </p:nvCxnSpPr>
+                <p:spPr>
+                  <a:xfrm rot="19800000">
+                    <a:off x="1949450" y="1358900"/>
+                    <a:ext cx="1083945" cy="45085"/>
+                  </a:xfrm>
+                  <a:prstGeom prst="straightConnector1">
+                    <a:avLst/>
+                  </a:prstGeom>
+                  <a:ln w="19050">
+                    <a:prstDash val="sysDot"/>
+                    <a:headEnd type="none" w="med" len="med"/>
+                    <a:tailEnd type="none" w="med" len="med"/>
+                  </a:ln>
+                </p:spPr>
+                <p:style>
+                  <a:lnRef idx="1">
+                    <a:schemeClr val="dk1"/>
+                  </a:lnRef>
+                  <a:fillRef idx="0">
+                    <a:schemeClr val="dk1"/>
+                  </a:fillRef>
+                  <a:effectRef idx="0">
+                    <a:schemeClr val="dk1"/>
+                  </a:effectRef>
+                  <a:fontRef idx="minor">
+                    <a:schemeClr val="tx1"/>
+                  </a:fontRef>
+                </p:style>
+              </p:cxnSp>
+              <p:cxnSp>
+                <p:nvCxnSpPr>
+                  <p:cNvPr id="32" name="Straight Arrow Connector 31">
+                    <a:extLst>
+                      <a:ext uri="{FF2B5EF4-FFF2-40B4-BE49-F238E27FC236}">
+                        <a16:creationId xmlns:a16="http://schemas.microsoft.com/office/drawing/2014/main" id="{01373B5E-708E-495C-BD56-1B66F8605FB3}"/>
+                      </a:ext>
+                    </a:extLst>
+                  </p:cNvPr>
+                  <p:cNvCxnSpPr/>
+                  <p:nvPr/>
+                </p:nvCxnSpPr>
+                <p:spPr>
+                  <a:xfrm rot="19800000">
+                    <a:off x="895350" y="736600"/>
+                    <a:ext cx="1084476" cy="45719"/>
+                  </a:xfrm>
+                  <a:prstGeom prst="straightConnector1">
+                    <a:avLst/>
+                  </a:prstGeom>
+                  <a:ln w="19050">
+                    <a:prstDash val="sysDot"/>
+                    <a:headEnd type="none" w="med" len="med"/>
+                    <a:tailEnd type="none" w="med" len="med"/>
+                  </a:ln>
+                </p:spPr>
+                <p:style>
+                  <a:lnRef idx="1">
+                    <a:schemeClr val="dk1"/>
+                  </a:lnRef>
+                  <a:fillRef idx="0">
+                    <a:schemeClr val="dk1"/>
+                  </a:fillRef>
+                  <a:effectRef idx="0">
+                    <a:schemeClr val="dk1"/>
+                  </a:effectRef>
+                  <a:fontRef idx="minor">
+                    <a:schemeClr val="tx1"/>
+                  </a:fontRef>
+                </p:style>
+              </p:cxnSp>
+              <mc:AlternateContent xmlns:mc="http://schemas.openxmlformats.org/markup-compatibility/2006">
+                <mc:Choice xmlns:a14="http://schemas.microsoft.com/office/drawing/2010/main" Requires="a14">
+                  <p:sp>
+                    <p:nvSpPr>
+                      <p:cNvPr id="33" name="Text Box 2">
+                        <a:extLst>
+                          <a:ext uri="{FF2B5EF4-FFF2-40B4-BE49-F238E27FC236}">
+                            <a16:creationId xmlns:a16="http://schemas.microsoft.com/office/drawing/2014/main" id="{67541E63-88AA-4C75-92FC-0A0C48CD4E93}"/>
+                          </a:ext>
+                        </a:extLst>
+                      </p:cNvPr>
+                      <p:cNvSpPr txBox="1">
+                        <a:spLocks noChangeArrowheads="1"/>
+                      </p:cNvSpPr>
+                      <p:nvPr/>
+                    </p:nvSpPr>
+                    <p:spPr bwMode="auto">
+                      <a:xfrm>
+                        <a:off x="3429000" y="2070100"/>
+                        <a:ext cx="328930" cy="336550"/>
+                      </a:xfrm>
+                      <a:prstGeom prst="rect">
+                        <a:avLst/>
+                      </a:prstGeom>
+                      <a:noFill/>
+                      <a:ln w="9525">
+                        <a:noFill/>
+                        <a:miter lim="800000"/>
+                        <a:headEnd/>
+                        <a:tailEnd/>
+                      </a:ln>
+                    </p:spPr>
+                    <p:txBody>
+                      <a:bodyPr rot="0" vert="horz" wrap="square" lIns="91440" tIns="45720" rIns="91440" bIns="45720" anchor="t" anchorCtr="0">
+                        <a:noAutofit/>
+                      </a:bodyPr>
+                      <a:lstStyle/>
+                      <a:p>
+                        <a:pPr marL="0" marR="0">
+                          <a:lnSpc>
+                            <a:spcPct val="107000"/>
+                          </a:lnSpc>
+                          <a:spcBef>
+                            <a:spcPts val="0"/>
+                          </a:spcBef>
+                          <a:spcAft>
+                            <a:spcPts val="800"/>
+                          </a:spcAft>
+                        </a:pPr>
+                        <a14:m>
+                          <m:oMathPara xmlns:m="http://schemas.openxmlformats.org/officeDocument/2006/math">
+                            <m:oMathParaPr>
+                              <m:jc m:val="centerGroup"/>
+                            </m:oMathParaPr>
+                            <m:oMath xmlns:m="http://schemas.openxmlformats.org/officeDocument/2006/math">
+                              <m:r>
+                                <a:rPr lang="en-US" sz="1100" b="1" i="1">
+                                  <a:effectLst/>
+                                  <a:latin typeface="Cambria Math" panose="02040503050406030204" pitchFamily="18" charset="0"/>
+                                  <a:ea typeface="Times New Roman" panose="02020603050405020304" pitchFamily="18" charset="0"/>
+                                  <a:cs typeface="Arial" panose="020B0604020202020204" pitchFamily="34" charset="0"/>
+                                </a:rPr>
+                                <m:t>𝒚</m:t>
+                              </m:r>
+                            </m:oMath>
+                          </m:oMathPara>
+                        </a14:m>
+                        <a:endParaRPr lang="en-US" sz="1100">
+                          <a:effectLst/>
+                          <a:latin typeface="Calibri" panose="020F0502020204030204" pitchFamily="34" charset="0"/>
+                          <a:ea typeface="Calibri" panose="020F0502020204030204" pitchFamily="34" charset="0"/>
+                          <a:cs typeface="Arial" panose="020B0604020202020204" pitchFamily="34" charset="0"/>
+                        </a:endParaRPr>
+                      </a:p>
+                    </p:txBody>
+                  </p:sp>
+                </mc:Choice>
+                <mc:Fallback>
+                  <p:sp>
+                    <p:nvSpPr>
+                      <p:cNvPr id="33" name="Text Box 2">
+                        <a:extLst>
+                          <a:ext uri="{FF2B5EF4-FFF2-40B4-BE49-F238E27FC236}">
+                            <a16:creationId xmlns:a16="http://schemas.microsoft.com/office/drawing/2014/main" id="{67541E63-88AA-4C75-92FC-0A0C48CD4E93}"/>
+                          </a:ext>
+                        </a:extLst>
+                      </p:cNvPr>
+                      <p:cNvSpPr txBox="1">
+                        <a:spLocks noRot="1" noChangeAspect="1" noMove="1" noResize="1" noEditPoints="1" noAdjustHandles="1" noChangeArrowheads="1" noChangeShapeType="1" noTextEdit="1"/>
+                      </p:cNvSpPr>
+                      <p:nvPr/>
+                    </p:nvSpPr>
+                    <p:spPr bwMode="auto">
+                      <a:xfrm>
+                        <a:off x="3429000" y="2070100"/>
+                        <a:ext cx="328930" cy="336550"/>
+                      </a:xfrm>
+                      <a:prstGeom prst="rect">
+                        <a:avLst/>
+                      </a:prstGeom>
+                      <a:blipFill>
+                        <a:blip r:embed="rId2"/>
+                        <a:stretch>
+                          <a:fillRect/>
+                        </a:stretch>
+                      </a:blipFill>
+                      <a:ln w="9525">
+                        <a:noFill/>
+                        <a:miter lim="800000"/>
+                        <a:headEnd/>
+                        <a:tailEnd/>
+                      </a:ln>
+                    </p:spPr>
+                    <p:txBody>
+                      <a:bodyPr/>
+                      <a:lstStyle/>
+                      <a:p>
+                        <a:r>
+                          <a:rPr lang="en-US">
+                            <a:noFill/>
+                          </a:rPr>
+                          <a:t> </a:t>
+                        </a:r>
+                      </a:p>
+                    </p:txBody>
+                  </p:sp>
+                </mc:Fallback>
+              </mc:AlternateContent>
+              <mc:AlternateContent xmlns:mc="http://schemas.openxmlformats.org/markup-compatibility/2006">
+                <mc:Choice xmlns:a14="http://schemas.microsoft.com/office/drawing/2010/main" Requires="a14">
+                  <p:sp>
+                    <p:nvSpPr>
+                      <p:cNvPr id="34" name="Text Box 2">
+                        <a:extLst>
+                          <a:ext uri="{FF2B5EF4-FFF2-40B4-BE49-F238E27FC236}">
+                            <a16:creationId xmlns:a16="http://schemas.microsoft.com/office/drawing/2014/main" id="{095724F9-DD6E-4B22-B9A3-D085D3D63E22}"/>
+                          </a:ext>
+                        </a:extLst>
+                      </p:cNvPr>
+                      <p:cNvSpPr txBox="1">
+                        <a:spLocks noChangeArrowheads="1"/>
+                      </p:cNvSpPr>
+                      <p:nvPr/>
+                    </p:nvSpPr>
+                    <p:spPr bwMode="auto">
+                      <a:xfrm>
+                        <a:off x="1930400" y="0"/>
+                        <a:ext cx="328930" cy="336550"/>
+                      </a:xfrm>
+                      <a:prstGeom prst="rect">
+                        <a:avLst/>
+                      </a:prstGeom>
+                      <a:noFill/>
+                      <a:ln w="9525">
+                        <a:noFill/>
+                        <a:miter lim="800000"/>
+                        <a:headEnd/>
+                        <a:tailEnd/>
+                      </a:ln>
+                    </p:spPr>
+                    <p:txBody>
+                      <a:bodyPr rot="0" vert="horz" wrap="square" lIns="91440" tIns="45720" rIns="91440" bIns="45720" anchor="t" anchorCtr="0">
+                        <a:noAutofit/>
+                      </a:bodyPr>
+                      <a:lstStyle/>
+                      <a:p>
+                        <a:pPr marL="0" marR="0">
+                          <a:lnSpc>
+                            <a:spcPct val="107000"/>
+                          </a:lnSpc>
+                          <a:spcBef>
+                            <a:spcPts val="0"/>
+                          </a:spcBef>
+                          <a:spcAft>
+                            <a:spcPts val="800"/>
+                          </a:spcAft>
+                        </a:pPr>
+                        <a14:m>
+                          <m:oMathPara xmlns:m="http://schemas.openxmlformats.org/officeDocument/2006/math">
+                            <m:oMathParaPr>
+                              <m:jc m:val="centerGroup"/>
+                            </m:oMathParaPr>
+                            <m:oMath xmlns:m="http://schemas.openxmlformats.org/officeDocument/2006/math">
+                              <m:r>
+                                <a:rPr lang="en-US" sz="1100" b="1" i="1">
+                                  <a:effectLst/>
+                                  <a:latin typeface="Cambria Math" panose="02040503050406030204" pitchFamily="18" charset="0"/>
+                                  <a:ea typeface="Times New Roman" panose="02020603050405020304" pitchFamily="18" charset="0"/>
+                                  <a:cs typeface="Arial" panose="020B0604020202020204" pitchFamily="34" charset="0"/>
+                                </a:rPr>
+                                <m:t>𝒛</m:t>
+                              </m:r>
+                            </m:oMath>
+                          </m:oMathPara>
+                        </a14:m>
+                        <a:endParaRPr lang="en-US" sz="1100">
+                          <a:effectLst/>
+                          <a:latin typeface="Calibri" panose="020F0502020204030204" pitchFamily="34" charset="0"/>
+                          <a:ea typeface="Calibri" panose="020F0502020204030204" pitchFamily="34" charset="0"/>
+                          <a:cs typeface="Arial" panose="020B0604020202020204" pitchFamily="34" charset="0"/>
+                        </a:endParaRPr>
+                      </a:p>
+                    </p:txBody>
+                  </p:sp>
+                </mc:Choice>
+                <mc:Fallback>
+                  <p:sp>
+                    <p:nvSpPr>
+                      <p:cNvPr id="34" name="Text Box 2">
+                        <a:extLst>
+                          <a:ext uri="{FF2B5EF4-FFF2-40B4-BE49-F238E27FC236}">
+                            <a16:creationId xmlns:a16="http://schemas.microsoft.com/office/drawing/2014/main" id="{095724F9-DD6E-4B22-B9A3-D085D3D63E22}"/>
+                          </a:ext>
+                        </a:extLst>
+                      </p:cNvPr>
+                      <p:cNvSpPr txBox="1">
+                        <a:spLocks noRot="1" noChangeAspect="1" noMove="1" noResize="1" noEditPoints="1" noAdjustHandles="1" noChangeArrowheads="1" noChangeShapeType="1" noTextEdit="1"/>
+                      </p:cNvSpPr>
+                      <p:nvPr/>
+                    </p:nvSpPr>
+                    <p:spPr bwMode="auto">
+                      <a:xfrm>
+                        <a:off x="1930400" y="0"/>
+                        <a:ext cx="328930" cy="336550"/>
+                      </a:xfrm>
+                      <a:prstGeom prst="rect">
+                        <a:avLst/>
+                      </a:prstGeom>
+                      <a:blipFill>
+                        <a:blip r:embed="rId3"/>
+                        <a:stretch>
+                          <a:fillRect/>
+                        </a:stretch>
+                      </a:blipFill>
+                      <a:ln w="9525">
+                        <a:noFill/>
+                        <a:miter lim="800000"/>
+                        <a:headEnd/>
+                        <a:tailEnd/>
+                      </a:ln>
+                    </p:spPr>
+                    <p:txBody>
+                      <a:bodyPr/>
+                      <a:lstStyle/>
+                      <a:p>
+                        <a:r>
+                          <a:rPr lang="en-US">
+                            <a:noFill/>
+                          </a:rPr>
+                          <a:t> </a:t>
+                        </a:r>
+                      </a:p>
+                    </p:txBody>
+                  </p:sp>
+                </mc:Fallback>
+              </mc:AlternateContent>
+            </p:grpSp>
+            <p:grpSp>
+              <p:nvGrpSpPr>
+                <p:cNvPr id="12" name="Group 11">
+                  <a:extLst>
+                    <a:ext uri="{FF2B5EF4-FFF2-40B4-BE49-F238E27FC236}">
+                      <a16:creationId xmlns:a16="http://schemas.microsoft.com/office/drawing/2014/main" id="{5771C9FA-E5CE-4855-9ABF-139DB4D276CB}"/>
+                    </a:ext>
+                  </a:extLst>
+                </p:cNvPr>
+                <p:cNvGrpSpPr/>
+                <p:nvPr/>
+              </p:nvGrpSpPr>
+              <p:grpSpPr>
+                <a:xfrm>
+                  <a:off x="1854200" y="990600"/>
+                  <a:ext cx="1162050" cy="1437005"/>
+                  <a:chOff x="0" y="-31750"/>
+                  <a:chExt cx="1162050" cy="1437005"/>
+                </a:xfrm>
+              </p:grpSpPr>
+              <p:sp>
+                <p:nvSpPr>
+                  <p:cNvPr id="13" name="Oval 12">
+                    <a:extLst>
+                      <a:ext uri="{FF2B5EF4-FFF2-40B4-BE49-F238E27FC236}">
+                        <a16:creationId xmlns:a16="http://schemas.microsoft.com/office/drawing/2014/main" id="{5AB5AC74-B4C0-4A14-8425-7DD53D849917}"/>
+                      </a:ext>
+                    </a:extLst>
+                  </p:cNvPr>
+                  <p:cNvSpPr/>
+                  <p:nvPr/>
+                </p:nvSpPr>
+                <p:spPr>
+                  <a:xfrm>
+                    <a:off x="0" y="292100"/>
+                    <a:ext cx="133350" cy="133350"/>
+                  </a:xfrm>
+                  <a:prstGeom prst="ellipse">
+                    <a:avLst/>
+                  </a:prstGeom>
+                  <a:solidFill>
+                    <a:srgbClr val="00B050"/>
+                  </a:solidFill>
+                </p:spPr>
+                <p:style>
+                  <a:lnRef idx="2">
+                    <a:schemeClr val="accent1">
+                      <a:shade val="50000"/>
+                    </a:schemeClr>
+                  </a:lnRef>
+                  <a:fillRef idx="1">
+                    <a:schemeClr val="accent1"/>
+                  </a:fillRef>
+                  <a:effectRef idx="0">
+                    <a:schemeClr val="accent1"/>
+                  </a:effectRef>
+                  <a:fontRef idx="minor">
+                    <a:schemeClr val="lt1"/>
+                  </a:fontRef>
+                </p:style>
+                <p:txBody>
+                  <a:bodyPr rot="0" spcFirstLastPara="0" vert="horz" wrap="square" lIns="91440" tIns="45720" rIns="91440" bIns="45720" numCol="1" spcCol="0" rtlCol="0" fromWordArt="0" anchor="ctr" anchorCtr="0" forceAA="0" compatLnSpc="1">
+                    <a:prstTxWarp prst="textNoShape">
+                      <a:avLst/>
+                    </a:prstTxWarp>
+                    <a:noAutofit/>
+                  </a:bodyPr>
+                  <a:lstStyle/>
+                  <a:p>
+                    <a:endParaRPr lang="en-US"/>
+                  </a:p>
+                </p:txBody>
+              </p:sp>
+              <p:sp>
+                <p:nvSpPr>
+                  <p:cNvPr id="14" name="Oval 13">
+                    <a:extLst>
+                      <a:ext uri="{FF2B5EF4-FFF2-40B4-BE49-F238E27FC236}">
+                        <a16:creationId xmlns:a16="http://schemas.microsoft.com/office/drawing/2014/main" id="{6E79A4B6-954D-4A43-9B12-B522CD3C0741}"/>
+                      </a:ext>
+                    </a:extLst>
+                  </p:cNvPr>
+                  <p:cNvSpPr/>
+                  <p:nvPr/>
+                </p:nvSpPr>
+                <p:spPr>
+                  <a:xfrm>
+                    <a:off x="1028700" y="-31750"/>
+                    <a:ext cx="133350" cy="133350"/>
+                  </a:xfrm>
+                  <a:prstGeom prst="ellipse">
+                    <a:avLst/>
+                  </a:prstGeom>
+                  <a:solidFill>
+                    <a:srgbClr val="FFC000"/>
+                  </a:solidFill>
+                </p:spPr>
+                <p:style>
+                  <a:lnRef idx="2">
+                    <a:schemeClr val="accent1">
+                      <a:shade val="50000"/>
+                    </a:schemeClr>
+                  </a:lnRef>
+                  <a:fillRef idx="1">
+                    <a:schemeClr val="accent1"/>
+                  </a:fillRef>
+                  <a:effectRef idx="0">
+                    <a:schemeClr val="accent1"/>
+                  </a:effectRef>
+                  <a:fontRef idx="minor">
+                    <a:schemeClr val="lt1"/>
+                  </a:fontRef>
+                </p:style>
+                <p:txBody>
+                  <a:bodyPr rot="0" spcFirstLastPara="0" vert="horz" wrap="square" lIns="91440" tIns="45720" rIns="91440" bIns="45720" numCol="1" spcCol="0" rtlCol="0" fromWordArt="0" anchor="ctr" anchorCtr="0" forceAA="0" compatLnSpc="1">
+                    <a:prstTxWarp prst="textNoShape">
+                      <a:avLst/>
+                    </a:prstTxWarp>
+                    <a:noAutofit/>
+                  </a:bodyPr>
+                  <a:lstStyle/>
+                  <a:p>
+                    <a:endParaRPr lang="en-US"/>
+                  </a:p>
+                </p:txBody>
+              </p:sp>
+              <p:cxnSp>
+                <p:nvCxnSpPr>
+                  <p:cNvPr id="15" name="Straight Arrow Connector 14">
+                    <a:extLst>
+                      <a:ext uri="{FF2B5EF4-FFF2-40B4-BE49-F238E27FC236}">
+                        <a16:creationId xmlns:a16="http://schemas.microsoft.com/office/drawing/2014/main" id="{B4F5D3C9-C5EE-4C52-9566-43E2C5E79EC1}"/>
+                      </a:ext>
+                    </a:extLst>
+                  </p:cNvPr>
+                  <p:cNvCxnSpPr/>
+                  <p:nvPr/>
+                </p:nvCxnSpPr>
+                <p:spPr>
+                  <a:xfrm rot="16200000" flipV="1">
+                    <a:off x="-285750" y="1016000"/>
+                    <a:ext cx="763905" cy="14605"/>
+                  </a:xfrm>
+                  <a:prstGeom prst="straightConnector1">
+                    <a:avLst/>
+                  </a:prstGeom>
+                  <a:ln w="19050">
+                    <a:prstDash val="sysDot"/>
+                    <a:headEnd type="none" w="med" len="med"/>
+                    <a:tailEnd type="none" w="med" len="med"/>
+                  </a:ln>
+                </p:spPr>
+                <p:style>
+                  <a:lnRef idx="1">
+                    <a:schemeClr val="dk1"/>
+                  </a:lnRef>
+                  <a:fillRef idx="0">
+                    <a:schemeClr val="dk1"/>
+                  </a:fillRef>
+                  <a:effectRef idx="0">
+                    <a:schemeClr val="dk1"/>
+                  </a:effectRef>
+                  <a:fontRef idx="minor">
+                    <a:schemeClr val="tx1"/>
+                  </a:fontRef>
+                </p:style>
+              </p:cxnSp>
+            </p:grpSp>
+          </p:grpSp>
+          <mc:AlternateContent xmlns:mc="http://schemas.openxmlformats.org/markup-compatibility/2006">
+            <mc:Choice xmlns:a14="http://schemas.microsoft.com/office/drawing/2010/main" Requires="a14">
+              <p:sp>
+                <p:nvSpPr>
+                  <p:cNvPr id="10" name="Text Box 2">
+                    <a:extLst>
+                      <a:ext uri="{FF2B5EF4-FFF2-40B4-BE49-F238E27FC236}">
+                        <a16:creationId xmlns:a16="http://schemas.microsoft.com/office/drawing/2014/main" id="{4C5E6BA2-F179-4778-822C-C3BBA133B064}"/>
+                      </a:ext>
+                    </a:extLst>
+                  </p:cNvPr>
+                  <p:cNvSpPr txBox="1">
+                    <a:spLocks noChangeArrowheads="1"/>
+                  </p:cNvSpPr>
+                  <p:nvPr/>
+                </p:nvSpPr>
+                <p:spPr bwMode="auto">
+                  <a:xfrm>
+                    <a:off x="215900" y="2228850"/>
+                    <a:ext cx="328930" cy="336550"/>
+                  </a:xfrm>
+                  <a:prstGeom prst="rect">
+                    <a:avLst/>
+                  </a:prstGeom>
+                  <a:noFill/>
+                  <a:ln w="9525">
+                    <a:noFill/>
+                    <a:miter lim="800000"/>
+                    <a:headEnd/>
+                    <a:tailEnd/>
+                  </a:ln>
+                </p:spPr>
+                <p:txBody>
+                  <a:bodyPr rot="0" vert="horz" wrap="square" lIns="91440" tIns="45720" rIns="91440" bIns="45720" anchor="t" anchorCtr="0">
+                    <a:noAutofit/>
+                  </a:bodyPr>
+                  <a:lstStyle/>
+                  <a:p>
+                    <a:pPr marL="0" marR="0">
+                      <a:lnSpc>
+                        <a:spcPct val="107000"/>
+                      </a:lnSpc>
+                      <a:spcBef>
+                        <a:spcPts val="0"/>
+                      </a:spcBef>
+                      <a:spcAft>
+                        <a:spcPts val="800"/>
+                      </a:spcAft>
+                    </a:pPr>
+                    <a14:m>
+                      <m:oMathPara xmlns:m="http://schemas.openxmlformats.org/officeDocument/2006/math">
+                        <m:oMathParaPr>
+                          <m:jc m:val="centerGroup"/>
+                        </m:oMathParaPr>
+                        <m:oMath xmlns:m="http://schemas.openxmlformats.org/officeDocument/2006/math">
+                          <m:r>
+                            <a:rPr lang="en-US" sz="1100" b="1" i="1">
+                              <a:effectLst/>
+                              <a:latin typeface="Cambria Math" panose="02040503050406030204" pitchFamily="18" charset="0"/>
+                              <a:ea typeface="Calibri" panose="020F0502020204030204" pitchFamily="34" charset="0"/>
+                              <a:cs typeface="Arial" panose="020B0604020202020204" pitchFamily="34" charset="0"/>
+                            </a:rPr>
+                            <m:t>𝒙</m:t>
+                          </m:r>
+                        </m:oMath>
+                      </m:oMathPara>
+                    </a14:m>
+                    <a:endParaRPr lang="en-US" sz="1100">
+                      <a:effectLst/>
+                      <a:latin typeface="Calibri" panose="020F0502020204030204" pitchFamily="34" charset="0"/>
+                      <a:ea typeface="Calibri" panose="020F0502020204030204" pitchFamily="34" charset="0"/>
+                      <a:cs typeface="Arial" panose="020B0604020202020204" pitchFamily="34" charset="0"/>
+                    </a:endParaRPr>
+                  </a:p>
+                </p:txBody>
+              </p:sp>
+            </mc:Choice>
+            <mc:Fallback>
+              <p:sp>
+                <p:nvSpPr>
+                  <p:cNvPr id="10" name="Text Box 2">
+                    <a:extLst>
+                      <a:ext uri="{FF2B5EF4-FFF2-40B4-BE49-F238E27FC236}">
+                        <a16:creationId xmlns:a16="http://schemas.microsoft.com/office/drawing/2014/main" id="{4C5E6BA2-F179-4778-822C-C3BBA133B064}"/>
+                      </a:ext>
+                    </a:extLst>
+                  </p:cNvPr>
+                  <p:cNvSpPr txBox="1">
+                    <a:spLocks noRot="1" noChangeAspect="1" noMove="1" noResize="1" noEditPoints="1" noAdjustHandles="1" noChangeArrowheads="1" noChangeShapeType="1" noTextEdit="1"/>
+                  </p:cNvSpPr>
+                  <p:nvPr/>
+                </p:nvSpPr>
+                <p:spPr bwMode="auto">
+                  <a:xfrm>
+                    <a:off x="215900" y="2228850"/>
+                    <a:ext cx="328930" cy="336550"/>
+                  </a:xfrm>
+                  <a:prstGeom prst="rect">
+                    <a:avLst/>
+                  </a:prstGeom>
+                  <a:blipFill>
+                    <a:blip r:embed="rId4"/>
+                    <a:stretch>
+                      <a:fillRect/>
+                    </a:stretch>
+                  </a:blipFill>
+                  <a:ln w="9525">
+                    <a:noFill/>
+                    <a:miter lim="800000"/>
+                    <a:headEnd/>
+                    <a:tailEnd/>
+                  </a:ln>
+                </p:spPr>
+                <p:txBody>
+                  <a:bodyPr/>
+                  <a:lstStyle/>
+                  <a:p>
+                    <a:r>
+                      <a:rPr lang="en-US">
+                        <a:noFill/>
+                      </a:rPr>
+                      <a:t> </a:t>
+                    </a:r>
+                  </a:p>
+                </p:txBody>
+              </p:sp>
+            </mc:Fallback>
+          </mc:AlternateContent>
+        </p:grpSp>
+        <p:sp>
+          <p:nvSpPr>
+            <p:cNvPr id="6" name="Rectangle 5">
+              <a:extLst>
+                <a:ext uri="{FF2B5EF4-FFF2-40B4-BE49-F238E27FC236}">
+                  <a16:creationId xmlns:a16="http://schemas.microsoft.com/office/drawing/2014/main" id="{F040C614-CFBF-4F97-B4F7-FF0D38CF8AB3}"/>
+                </a:ext>
+              </a:extLst>
+            </p:cNvPr>
+            <p:cNvSpPr/>
+            <p:nvPr/>
+          </p:nvSpPr>
+          <p:spPr>
+            <a:xfrm>
+              <a:off x="1079500" y="736600"/>
+              <a:ext cx="1746250" cy="1720850"/>
+            </a:xfrm>
+            <a:prstGeom prst="rect">
+              <a:avLst/>
+            </a:prstGeom>
+            <a:solidFill>
+              <a:srgbClr val="4472C4">
+                <a:alpha val="18824"/>
+              </a:srgbClr>
+            </a:solidFill>
+            <a:scene3d>
+              <a:camera prst="isometricRightUp"/>
+              <a:lightRig rig="threePt" dir="t"/>
+            </a:scene3d>
+          </p:spPr>
+          <p:style>
+            <a:lnRef idx="2">
+              <a:schemeClr val="accent1">
+                <a:shade val="50000"/>
+              </a:schemeClr>
+            </a:lnRef>
+            <a:fillRef idx="1">
+              <a:schemeClr val="accent1"/>
+            </a:fillRef>
+            <a:effectRef idx="0">
+              <a:schemeClr val="accent1"/>
+            </a:effectRef>
+            <a:fontRef idx="minor">
+              <a:schemeClr val="lt1"/>
+            </a:fontRef>
+          </p:style>
+          <p:txBody>
+            <a:bodyPr rot="0" spcFirstLastPara="0" vert="horz" wrap="square" lIns="91440" tIns="45720" rIns="91440" bIns="45720" numCol="1" spcCol="0" rtlCol="0" fromWordArt="0" anchor="ctr" anchorCtr="0" forceAA="0" compatLnSpc="1">
+              <a:prstTxWarp prst="textNoShape">
+                <a:avLst/>
+              </a:prstTxWarp>
+              <a:noAutofit/>
+            </a:bodyPr>
+            <a:lstStyle/>
+            <a:p>
+              <a:endParaRPr lang="en-US"/>
+            </a:p>
+          </p:txBody>
+        </p:sp>
+        <p:sp>
+          <p:nvSpPr>
+            <p:cNvPr id="7" name="Freeform: Shape 6">
+              <a:extLst>
+                <a:ext uri="{FF2B5EF4-FFF2-40B4-BE49-F238E27FC236}">
+                  <a16:creationId xmlns:a16="http://schemas.microsoft.com/office/drawing/2014/main" id="{0A528789-11BD-4FF8-B82B-95287A12EDBB}"/>
+                </a:ext>
+              </a:extLst>
+            </p:cNvPr>
+            <p:cNvSpPr/>
+            <p:nvPr/>
+          </p:nvSpPr>
+          <p:spPr>
+            <a:xfrm>
+              <a:off x="2622550" y="0"/>
+              <a:ext cx="1085850" cy="533451"/>
+            </a:xfrm>
+            <a:custGeom>
+              <a:avLst/>
+              <a:gdLst>
+                <a:gd name="connsiteX0" fmla="*/ 1085850 w 1085850"/>
+                <a:gd name="connsiteY0" fmla="*/ 533451 h 533451"/>
+                <a:gd name="connsiteX1" fmla="*/ 596900 w 1085850"/>
+                <a:gd name="connsiteY1" fmla="*/ 51 h 533451"/>
+                <a:gd name="connsiteX2" fmla="*/ 0 w 1085850"/>
+                <a:gd name="connsiteY2" fmla="*/ 508051 h 533451"/>
+              </a:gdLst>
+              <a:ahLst/>
+              <a:cxnLst>
+                <a:cxn ang="0">
+                  <a:pos x="connsiteX0" y="connsiteY0"/>
+                </a:cxn>
+                <a:cxn ang="0">
+                  <a:pos x="connsiteX1" y="connsiteY1"/>
+                </a:cxn>
+                <a:cxn ang="0">
+                  <a:pos x="connsiteX2" y="connsiteY2"/>
+                </a:cxn>
+              </a:cxnLst>
+              <a:rect l="l" t="t" r="r" b="b"/>
+              <a:pathLst>
+                <a:path w="1085850" h="533451">
+                  <a:moveTo>
+                    <a:pt x="1085850" y="533451"/>
+                  </a:moveTo>
+                  <a:cubicBezTo>
+                    <a:pt x="931862" y="268867"/>
+                    <a:pt x="777875" y="4284"/>
+                    <a:pt x="596900" y="51"/>
+                  </a:cubicBezTo>
+                  <a:cubicBezTo>
+                    <a:pt x="415925" y="-4182"/>
+                    <a:pt x="207962" y="251934"/>
+                    <a:pt x="0" y="508051"/>
+                  </a:cubicBezTo>
+                </a:path>
+              </a:pathLst>
+            </a:custGeom>
+            <a:noFill/>
+            <a:ln>
+              <a:solidFill>
+                <a:srgbClr val="2F52B7"/>
+              </a:solidFill>
+              <a:headEnd type="none" w="med" len="med"/>
+              <a:tailEnd type="arrow" w="med" len="med"/>
+            </a:ln>
+          </p:spPr>
+          <p:style>
+            <a:lnRef idx="2">
+              <a:schemeClr val="accent1">
+                <a:shade val="50000"/>
+              </a:schemeClr>
+            </a:lnRef>
+            <a:fillRef idx="1">
+              <a:schemeClr val="accent1"/>
+            </a:fillRef>
+            <a:effectRef idx="0">
+              <a:schemeClr val="accent1"/>
+            </a:effectRef>
+            <a:fontRef idx="minor">
+              <a:schemeClr val="lt1"/>
+            </a:fontRef>
+          </p:style>
+          <p:txBody>
+            <a:bodyPr rot="0" spcFirstLastPara="0" vert="horz" wrap="square" lIns="91440" tIns="45720" rIns="91440" bIns="45720" numCol="1" spcCol="0" rtlCol="0" fromWordArt="0" anchor="ctr" anchorCtr="0" forceAA="0" compatLnSpc="1">
+              <a:prstTxWarp prst="textNoShape">
+                <a:avLst/>
+              </a:prstTxWarp>
+              <a:noAutofit/>
+            </a:bodyPr>
+            <a:lstStyle/>
+            <a:p>
+              <a:endParaRPr lang="en-US"/>
+            </a:p>
+          </p:txBody>
+        </p:sp>
+        <p:sp>
+          <p:nvSpPr>
+            <p:cNvPr id="8" name="Text Box 2">
+              <a:extLst>
+                <a:ext uri="{FF2B5EF4-FFF2-40B4-BE49-F238E27FC236}">
+                  <a16:creationId xmlns:a16="http://schemas.microsoft.com/office/drawing/2014/main" id="{8C302894-B2A9-40AD-A404-E39C60F554EE}"/>
+                </a:ext>
+              </a:extLst>
+            </p:cNvPr>
+            <p:cNvSpPr txBox="1">
+              <a:spLocks noChangeArrowheads="1"/>
+            </p:cNvSpPr>
+            <p:nvPr/>
+          </p:nvSpPr>
+          <p:spPr bwMode="auto">
+            <a:xfrm>
+              <a:off x="2971800" y="527050"/>
+              <a:ext cx="1638300" cy="386080"/>
+            </a:xfrm>
+            <a:prstGeom prst="rect">
+              <a:avLst/>
+            </a:prstGeom>
+            <a:noFill/>
+            <a:ln w="9525">
+              <a:noFill/>
+              <a:miter lim="800000"/>
+              <a:headEnd/>
+              <a:tailEnd/>
+            </a:ln>
+          </p:spPr>
+          <p:txBody>
+            <a:bodyPr rot="0" vert="horz" wrap="square" lIns="91440" tIns="45720" rIns="91440" bIns="45720" anchor="t" anchorCtr="0">
+              <a:spAutoFit/>
+            </a:bodyPr>
+            <a:lstStyle/>
+            <a:p>
+              <a:pPr marL="0" marR="0">
+                <a:lnSpc>
+                  <a:spcPct val="107000"/>
+                </a:lnSpc>
+                <a:spcBef>
+                  <a:spcPts val="0"/>
+                </a:spcBef>
+                <a:spcAft>
+                  <a:spcPts val="800"/>
+                </a:spcAft>
+              </a:pPr>
+              <a:r>
+                <a:rPr lang="en-US" sz="1100" b="1" i="1">
+                  <a:solidFill>
+                    <a:srgbClr val="2F52B7"/>
+                  </a:solidFill>
+                  <a:effectLst/>
+                  <a:latin typeface="Calibri" panose="020F0502020204030204" pitchFamily="34" charset="0"/>
+                  <a:ea typeface="Calibri" panose="020F0502020204030204" pitchFamily="34" charset="0"/>
+                  <a:cs typeface="Arial" panose="020B0604020202020204" pitchFamily="34" charset="0"/>
+                </a:rPr>
+                <a:t>Separating Hyperplane</a:t>
+              </a:r>
+              <a:endParaRPr lang="en-US" sz="1100">
+                <a:effectLst/>
+                <a:latin typeface="Calibri" panose="020F0502020204030204" pitchFamily="34" charset="0"/>
+                <a:ea typeface="Calibri" panose="020F0502020204030204" pitchFamily="34" charset="0"/>
+                <a:cs typeface="Arial" panose="020B0604020202020204" pitchFamily="34" charset="0"/>
+              </a:endParaRPr>
+            </a:p>
+          </p:txBody>
+        </p:sp>
+      </p:grpSp>
+    </p:spTree>
+    <p:extLst>
+      <p:ext uri="{BB962C8B-B14F-4D97-AF65-F5344CB8AC3E}">
+        <p14:creationId xmlns:p14="http://schemas.microsoft.com/office/powerpoint/2010/main" val="1129981336"/>
+      </p:ext>
+    </p:extLst>
+  </p:cSld>
+  <p:clrMapOvr>
+    <a:masterClrMapping/>
+  </p:clrMapOvr>
+</p:sld>
+</file>
+
+<file path=ppt/slides/slide5.xml><?xml version="1.0" encoding="utf-8"?>
+<p:sld xmlns:a="http://schemas.openxmlformats.org/drawingml/2006/main" xmlns:r="http://schemas.openxmlformats.org/officeDocument/2006/relationships" xmlns:p="http://schemas.openxmlformats.org/presentationml/2006/main">
+  <p:cSld>
+    <p:spTree>
+      <p:nvGrpSpPr>
+        <p:cNvPr id="1" name=""/>
+        <p:cNvGrpSpPr/>
+        <p:nvPr/>
+      </p:nvGrpSpPr>
+      <p:grpSpPr>
+        <a:xfrm>
+          <a:off x="0" y="0"/>
+          <a:ext cx="0" cy="0"/>
+          <a:chOff x="0" y="0"/>
+          <a:chExt cx="0" cy="0"/>
+        </a:xfrm>
+      </p:grpSpPr>
+      <p:grpSp>
+        <p:nvGrpSpPr>
+          <p:cNvPr id="4" name="Group 3">
+            <a:extLst>
+              <a:ext uri="{FF2B5EF4-FFF2-40B4-BE49-F238E27FC236}">
                 <a16:creationId xmlns:a16="http://schemas.microsoft.com/office/drawing/2014/main" id="{51D3540F-900B-404A-AAE4-0E9FB711B75F}"/>
               </a:ext>
             </a:extLst>

</xml_diff>